<commit_message>
types of RS elaboration
</commit_message>
<xml_diff>
--- a/Movie_RS.pptx
+++ b/Movie_RS.pptx
@@ -9,11 +9,14 @@
     <p:sldId id="262" r:id="rId6"/>
     <p:sldId id="263" r:id="rId7"/>
     <p:sldId id="264" r:id="rId8"/>
-    <p:sldId id="265" r:id="rId9"/>
-    <p:sldId id="266" r:id="rId10"/>
-    <p:sldId id="267" r:id="rId11"/>
-    <p:sldId id="269" r:id="rId12"/>
-    <p:sldId id="261" r:id="rId13"/>
+    <p:sldId id="270" r:id="rId9"/>
+    <p:sldId id="271" r:id="rId10"/>
+    <p:sldId id="272" r:id="rId11"/>
+    <p:sldId id="265" r:id="rId12"/>
+    <p:sldId id="266" r:id="rId13"/>
+    <p:sldId id="267" r:id="rId14"/>
+    <p:sldId id="269" r:id="rId15"/>
+    <p:sldId id="261" r:id="rId16"/>
   </p:sldIdLst>
   <p:sldSz cx="12192000" cy="6858000"/>
   <p:notesSz cx="6858000" cy="9144000"/>
@@ -6945,7 +6948,7 @@
 </p:sld>
 </file>
 
-<file path=ppt/slides/slide2.xml><?xml version="1.0" encoding="utf-8"?>
+<file path=ppt/slides/slide10.xml><?xml version="1.0" encoding="utf-8"?>
 <p:sld xmlns:a="http://schemas.openxmlformats.org/drawingml/2006/main" xmlns:r="http://schemas.openxmlformats.org/officeDocument/2006/relationships" xmlns:p="http://schemas.openxmlformats.org/presentationml/2006/main">
   <p:cSld>
     <p:bg>
@@ -6972,7 +6975,7 @@
       </p:grpSpPr>
       <p:sp useBgFill="1">
         <p:nvSpPr>
-          <p:cNvPr id="24" name="Rectangle 7">
+          <p:cNvPr id="23" name="Rectangle 14">
             <a:extLst>
               <a:ext uri="{FF2B5EF4-FFF2-40B4-BE49-F238E27FC236}">
                 <a16:creationId xmlns:a16="http://schemas.microsoft.com/office/drawing/2014/main" id="{B373F125-DEF3-41D6-9918-AB21A2ACC37A}"/>
@@ -7032,7 +7035,7 @@
       </p:sp>
       <p:sp>
         <p:nvSpPr>
-          <p:cNvPr id="25" name="Rectangle 9">
+          <p:cNvPr id="24" name="Rectangle 16">
             <a:extLst>
               <a:ext uri="{FF2B5EF4-FFF2-40B4-BE49-F238E27FC236}">
                 <a16:creationId xmlns:a16="http://schemas.microsoft.com/office/drawing/2014/main" id="{71E9F226-EB6E-48C9-ADDA-636DE4BF4EBE}"/>
@@ -7095,6 +7098,743 @@
           <p:cNvPr id="2" name="Title 1">
             <a:extLst>
               <a:ext uri="{FF2B5EF4-FFF2-40B4-BE49-F238E27FC236}">
+                <a16:creationId xmlns:a16="http://schemas.microsoft.com/office/drawing/2014/main" id="{ACC8C168-C2AD-4557-B94F-FF161D69725E}"/>
+              </a:ext>
+            </a:extLst>
+          </p:cNvPr>
+          <p:cNvSpPr>
+            <a:spLocks noGrp="1"/>
+          </p:cNvSpPr>
+          <p:nvPr>
+            <p:ph type="title"/>
+          </p:nvPr>
+        </p:nvSpPr>
+        <p:spPr>
+          <a:xfrm>
+            <a:off x="959157" y="1113764"/>
+            <a:ext cx="3269749" cy="4624327"/>
+          </a:xfrm>
+        </p:spPr>
+        <p:txBody>
+          <a:bodyPr anchor="ctr">
+            <a:normAutofit/>
+          </a:bodyPr>
+          <a:lstStyle/>
+          <a:p>
+            <a:r>
+              <a:rPr lang="en-US" sz="3200">
+                <a:solidFill>
+                  <a:srgbClr val="FFFFFF"/>
+                </a:solidFill>
+              </a:rPr>
+              <a:t>Overcome the cold start problem</a:t>
+            </a:r>
+          </a:p>
+        </p:txBody>
+      </p:sp>
+      <p:sp>
+        <p:nvSpPr>
+          <p:cNvPr id="3" name="Content Placeholder 2">
+            <a:extLst>
+              <a:ext uri="{FF2B5EF4-FFF2-40B4-BE49-F238E27FC236}">
+                <a16:creationId xmlns:a16="http://schemas.microsoft.com/office/drawing/2014/main" id="{03B22758-B9F3-4178-AF0F-07017727B833}"/>
+              </a:ext>
+            </a:extLst>
+          </p:cNvPr>
+          <p:cNvSpPr>
+            <a:spLocks noGrp="1"/>
+          </p:cNvSpPr>
+          <p:nvPr>
+            <p:ph idx="1"/>
+          </p:nvPr>
+        </p:nvSpPr>
+        <p:spPr>
+          <a:xfrm>
+            <a:off x="5155905" y="1113764"/>
+            <a:ext cx="6108179" cy="4624327"/>
+          </a:xfrm>
+        </p:spPr>
+        <p:txBody>
+          <a:bodyPr anchor="ctr">
+            <a:normAutofit/>
+          </a:bodyPr>
+          <a:lstStyle/>
+          <a:p>
+            <a:pPr marL="0" indent="0">
+              <a:buNone/>
+            </a:pPr>
+            <a:r>
+              <a:rPr lang="en-US" b="1" i="0" dirty="0">
+                <a:effectLst/>
+              </a:rPr>
+              <a:t>NEW USER COLD START SOLUTIONS</a:t>
+            </a:r>
+          </a:p>
+          <a:p>
+            <a:r>
+              <a:rPr lang="en-US" b="0" i="0" dirty="0">
+                <a:effectLst/>
+              </a:rPr>
+              <a:t>Use implicit data</a:t>
+            </a:r>
+          </a:p>
+          <a:p>
+            <a:r>
+              <a:rPr lang="en-US" b="0" i="0" dirty="0">
+                <a:effectLst/>
+              </a:rPr>
+              <a:t>Recommend top sellers / do promotions</a:t>
+            </a:r>
+            <a:endParaRPr lang="en-US" dirty="0"/>
+          </a:p>
+          <a:p>
+            <a:r>
+              <a:rPr lang="en-US" b="0" i="0" dirty="0">
+                <a:effectLst/>
+              </a:rPr>
+              <a:t> Interview the user</a:t>
+            </a:r>
+          </a:p>
+          <a:p>
+            <a:pPr marL="0" indent="0">
+              <a:buNone/>
+            </a:pPr>
+            <a:r>
+              <a:rPr lang="en-US" b="1" i="0" dirty="0">
+                <a:effectLst/>
+              </a:rPr>
+              <a:t>NEW ITEM COLD START SOLUTIONS</a:t>
+            </a:r>
+          </a:p>
+          <a:p>
+            <a:r>
+              <a:rPr lang="en-US" b="0" i="0" dirty="0">
+                <a:effectLst/>
+              </a:rPr>
+              <a:t>Content-based Recommendations</a:t>
+            </a:r>
+          </a:p>
+          <a:p>
+            <a:r>
+              <a:rPr lang="en-US" b="0" i="0" dirty="0">
+                <a:effectLst/>
+              </a:rPr>
+              <a:t>Random Exploration</a:t>
+            </a:r>
+            <a:endParaRPr lang="en-US" dirty="0"/>
+          </a:p>
+          <a:p>
+            <a:r>
+              <a:rPr lang="en-US" b="0" i="0" dirty="0">
+                <a:effectLst/>
+              </a:rPr>
+              <a:t>Map content attributes to hidden features found by matrix factorization</a:t>
+            </a:r>
+            <a:endParaRPr lang="en-US" dirty="0"/>
+          </a:p>
+        </p:txBody>
+      </p:sp>
+    </p:spTree>
+    <p:extLst>
+      <p:ext uri="{BB962C8B-B14F-4D97-AF65-F5344CB8AC3E}">
+        <p14:creationId xmlns:p14="http://schemas.microsoft.com/office/powerpoint/2010/main" val="1515619071"/>
+      </p:ext>
+    </p:extLst>
+  </p:cSld>
+  <p:clrMapOvr>
+    <a:masterClrMapping/>
+  </p:clrMapOvr>
+</p:sld>
+</file>
+
+<file path=ppt/slides/slide11.xml><?xml version="1.0" encoding="utf-8"?>
+<p:sld xmlns:a="http://schemas.openxmlformats.org/drawingml/2006/main" xmlns:r="http://schemas.openxmlformats.org/officeDocument/2006/relationships" xmlns:p="http://schemas.openxmlformats.org/presentationml/2006/main">
+  <p:cSld>
+    <p:spTree>
+      <p:nvGrpSpPr>
+        <p:cNvPr id="1" name=""/>
+        <p:cNvGrpSpPr/>
+        <p:nvPr/>
+      </p:nvGrpSpPr>
+      <p:grpSpPr>
+        <a:xfrm>
+          <a:off x="0" y="0"/>
+          <a:ext cx="0" cy="0"/>
+          <a:chOff x="0" y="0"/>
+          <a:chExt cx="0" cy="0"/>
+        </a:xfrm>
+      </p:grpSpPr>
+      <p:sp>
+        <p:nvSpPr>
+          <p:cNvPr id="2" name="Title 1">
+            <a:extLst>
+              <a:ext uri="{FF2B5EF4-FFF2-40B4-BE49-F238E27FC236}">
+                <a16:creationId xmlns:a16="http://schemas.microsoft.com/office/drawing/2014/main" id="{63E061F6-B5EA-4F50-8CBF-A15FDC85F066}"/>
+              </a:ext>
+            </a:extLst>
+          </p:cNvPr>
+          <p:cNvSpPr>
+            <a:spLocks noGrp="1"/>
+          </p:cNvSpPr>
+          <p:nvPr>
+            <p:ph type="title"/>
+          </p:nvPr>
+        </p:nvSpPr>
+        <p:spPr/>
+        <p:txBody>
+          <a:bodyPr/>
+          <a:lstStyle/>
+          <a:p>
+            <a:r>
+              <a:rPr lang="en-US" dirty="0"/>
+              <a:t>Advantage and disadvantage of recommendation system</a:t>
+            </a:r>
+          </a:p>
+        </p:txBody>
+      </p:sp>
+      <p:sp>
+        <p:nvSpPr>
+          <p:cNvPr id="3" name="Content Placeholder 2">
+            <a:extLst>
+              <a:ext uri="{FF2B5EF4-FFF2-40B4-BE49-F238E27FC236}">
+                <a16:creationId xmlns:a16="http://schemas.microsoft.com/office/drawing/2014/main" id="{FE9CEA21-1B95-49A9-BE76-EB4ECE53C140}"/>
+              </a:ext>
+            </a:extLst>
+          </p:cNvPr>
+          <p:cNvSpPr>
+            <a:spLocks noGrp="1"/>
+          </p:cNvSpPr>
+          <p:nvPr>
+            <p:ph sz="half" idx="1"/>
+          </p:nvPr>
+        </p:nvSpPr>
+        <p:spPr>
+          <a:xfrm>
+            <a:off x="581194" y="3088462"/>
+            <a:ext cx="5422390" cy="3633047"/>
+          </a:xfrm>
+        </p:spPr>
+        <p:txBody>
+          <a:bodyPr>
+            <a:normAutofit fontScale="92500" lnSpcReduction="20000"/>
+          </a:bodyPr>
+          <a:lstStyle/>
+          <a:p>
+            <a:pPr marL="0" indent="0" algn="l">
+              <a:buNone/>
+            </a:pPr>
+            <a:r>
+              <a:rPr lang="en-US" sz="2400" b="1" dirty="0"/>
+              <a:t>Advantage for </a:t>
+            </a:r>
+            <a:r>
+              <a:rPr lang="en-US" sz="2400" b="1" i="0" dirty="0">
+                <a:solidFill>
+                  <a:srgbClr val="000000"/>
+                </a:solidFill>
+                <a:effectLst/>
+              </a:rPr>
+              <a:t>Collaborative </a:t>
+            </a:r>
+          </a:p>
+          <a:p>
+            <a:pPr marL="0" indent="0" algn="l">
+              <a:buNone/>
+            </a:pPr>
+            <a:r>
+              <a:rPr lang="en-US" sz="2400" b="1" i="0" dirty="0">
+                <a:solidFill>
+                  <a:srgbClr val="000000"/>
+                </a:solidFill>
+                <a:effectLst/>
+              </a:rPr>
+              <a:t>recommendation </a:t>
+            </a:r>
+          </a:p>
+          <a:p>
+            <a:r>
+              <a:rPr lang="en-US" i="0" dirty="0">
+                <a:solidFill>
+                  <a:srgbClr val="202124"/>
+                </a:solidFill>
+                <a:effectLst/>
+              </a:rPr>
+              <a:t>No domain knowledge necessary</a:t>
+            </a:r>
+          </a:p>
+          <a:p>
+            <a:pPr algn="l"/>
+            <a:r>
+              <a:rPr lang="en-US" b="0" i="0" dirty="0">
+                <a:solidFill>
+                  <a:srgbClr val="000000"/>
+                </a:solidFill>
+                <a:effectLst/>
+              </a:rPr>
+              <a:t>The system matches similar items between users. </a:t>
+            </a:r>
+          </a:p>
+          <a:p>
+            <a:pPr algn="l"/>
+            <a:r>
+              <a:rPr lang="en-US" i="0" dirty="0">
+                <a:solidFill>
+                  <a:srgbClr val="202124"/>
+                </a:solidFill>
+                <a:effectLst/>
+              </a:rPr>
+              <a:t>Great starting point</a:t>
+            </a:r>
+          </a:p>
+          <a:p>
+            <a:pPr marL="0" indent="0" algn="l">
+              <a:buNone/>
+            </a:pPr>
+            <a:r>
+              <a:rPr lang="en-US" sz="2400" b="1" dirty="0"/>
+              <a:t>Advantage for Content Based</a:t>
+            </a:r>
+          </a:p>
+          <a:p>
+            <a:pPr algn="l"/>
+            <a:r>
+              <a:rPr lang="en-US" b="0" i="0" dirty="0">
+                <a:solidFill>
+                  <a:srgbClr val="000000"/>
+                </a:solidFill>
+                <a:effectLst/>
+              </a:rPr>
+              <a:t>The system didn’t use the user's data to recommend items. </a:t>
+            </a:r>
+          </a:p>
+          <a:p>
+            <a:pPr algn="l"/>
+            <a:r>
+              <a:rPr lang="en-US" b="0" i="0" dirty="0">
+                <a:solidFill>
+                  <a:srgbClr val="000000"/>
+                </a:solidFill>
+                <a:effectLst/>
+              </a:rPr>
+              <a:t>The system has the ability to recommend new items to the users based on similarity between items specifications.. </a:t>
+            </a:r>
+          </a:p>
+          <a:p>
+            <a:pPr algn="l"/>
+            <a:endParaRPr lang="en-US" b="0" i="0" dirty="0">
+              <a:solidFill>
+                <a:srgbClr val="000000"/>
+              </a:solidFill>
+              <a:effectLst/>
+              <a:latin typeface="ff1"/>
+            </a:endParaRPr>
+          </a:p>
+          <a:p>
+            <a:endParaRPr lang="en-US" i="0" dirty="0">
+              <a:solidFill>
+                <a:srgbClr val="000000"/>
+              </a:solidFill>
+              <a:effectLst/>
+            </a:endParaRPr>
+          </a:p>
+          <a:p>
+            <a:endParaRPr lang="en-US" dirty="0"/>
+          </a:p>
+          <a:p>
+            <a:endParaRPr lang="en-US" sz="2400" dirty="0"/>
+          </a:p>
+          <a:p>
+            <a:pPr marL="0" indent="0">
+              <a:buNone/>
+            </a:pPr>
+            <a:endParaRPr lang="en-US" dirty="0"/>
+          </a:p>
+        </p:txBody>
+      </p:sp>
+      <p:sp>
+        <p:nvSpPr>
+          <p:cNvPr id="4" name="Content Placeholder 3">
+            <a:extLst>
+              <a:ext uri="{FF2B5EF4-FFF2-40B4-BE49-F238E27FC236}">
+                <a16:creationId xmlns:a16="http://schemas.microsoft.com/office/drawing/2014/main" id="{AFA84FA7-9FEF-4B66-BBB6-815F34EEDCF1}"/>
+              </a:ext>
+            </a:extLst>
+          </p:cNvPr>
+          <p:cNvSpPr>
+            <a:spLocks noGrp="1"/>
+          </p:cNvSpPr>
+          <p:nvPr>
+            <p:ph sz="half" idx="2"/>
+          </p:nvPr>
+        </p:nvSpPr>
+        <p:spPr/>
+        <p:txBody>
+          <a:bodyPr>
+            <a:normAutofit fontScale="92500" lnSpcReduction="20000"/>
+          </a:bodyPr>
+          <a:lstStyle/>
+          <a:p>
+            <a:pPr marL="0" indent="0" algn="l">
+              <a:buNone/>
+            </a:pPr>
+            <a:r>
+              <a:rPr lang="en-US" sz="2400" b="1" dirty="0"/>
+              <a:t>Disadvantage for </a:t>
+            </a:r>
+            <a:r>
+              <a:rPr lang="en-US" sz="2400" b="1" i="0" dirty="0">
+                <a:solidFill>
+                  <a:srgbClr val="000000"/>
+                </a:solidFill>
+                <a:effectLst/>
+              </a:rPr>
+              <a:t>Collaborative </a:t>
+            </a:r>
+          </a:p>
+          <a:p>
+            <a:pPr marL="0" indent="0" algn="l">
+              <a:buNone/>
+            </a:pPr>
+            <a:r>
+              <a:rPr lang="en-US" sz="2400" b="1" i="0" dirty="0">
+                <a:solidFill>
+                  <a:srgbClr val="000000"/>
+                </a:solidFill>
+                <a:effectLst/>
+              </a:rPr>
+              <a:t>recommendation </a:t>
+            </a:r>
+          </a:p>
+          <a:p>
+            <a:r>
+              <a:rPr lang="en-US" i="0" dirty="0">
+                <a:solidFill>
+                  <a:srgbClr val="202124"/>
+                </a:solidFill>
+                <a:effectLst/>
+              </a:rPr>
+              <a:t>Cannot handle fresh items</a:t>
+            </a:r>
+          </a:p>
+          <a:p>
+            <a:pPr algn="l"/>
+            <a:r>
+              <a:rPr lang="en-US" b="0" i="0" dirty="0">
+                <a:solidFill>
+                  <a:srgbClr val="000000"/>
+                </a:solidFill>
+                <a:effectLst/>
+              </a:rPr>
+              <a:t>The quality of the system depends on the highest rating item list. </a:t>
+            </a:r>
+          </a:p>
+          <a:p>
+            <a:pPr marL="0" indent="0">
+              <a:buNone/>
+            </a:pPr>
+            <a:r>
+              <a:rPr lang="en-US" sz="2400" b="1" dirty="0"/>
+              <a:t>Disadvantage for Content Based</a:t>
+            </a:r>
+          </a:p>
+          <a:p>
+            <a:pPr algn="l"/>
+            <a:r>
+              <a:rPr lang="en-US" b="0" i="0" dirty="0">
+                <a:solidFill>
+                  <a:srgbClr val="000000"/>
+                </a:solidFill>
+                <a:effectLst/>
+              </a:rPr>
+              <a:t>We need for analysis and detect all item features to create a recommendation list </a:t>
+            </a:r>
+          </a:p>
+          <a:p>
+            <a:pPr marL="0" indent="0" algn="l">
+              <a:buNone/>
+            </a:pPr>
+            <a:endParaRPr lang="en-US" b="0" i="0" dirty="0">
+              <a:solidFill>
+                <a:srgbClr val="000000"/>
+              </a:solidFill>
+              <a:effectLst/>
+              <a:latin typeface="ff1"/>
+            </a:endParaRPr>
+          </a:p>
+          <a:p>
+            <a:pPr marL="0" indent="0">
+              <a:buNone/>
+            </a:pPr>
+            <a:endParaRPr lang="en-US" sz="1800" dirty="0"/>
+          </a:p>
+          <a:p>
+            <a:endParaRPr lang="en-US" dirty="0"/>
+          </a:p>
+        </p:txBody>
+      </p:sp>
+    </p:spTree>
+    <p:extLst>
+      <p:ext uri="{BB962C8B-B14F-4D97-AF65-F5344CB8AC3E}">
+        <p14:creationId xmlns:p14="http://schemas.microsoft.com/office/powerpoint/2010/main" val="3580546117"/>
+      </p:ext>
+    </p:extLst>
+  </p:cSld>
+  <p:clrMapOvr>
+    <a:masterClrMapping/>
+  </p:clrMapOvr>
+</p:sld>
+</file>
+
+<file path=ppt/slides/slide12.xml><?xml version="1.0" encoding="utf-8"?>
+<p:sld xmlns:a="http://schemas.openxmlformats.org/drawingml/2006/main" xmlns:r="http://schemas.openxmlformats.org/officeDocument/2006/relationships" xmlns:p="http://schemas.openxmlformats.org/presentationml/2006/main">
+  <p:cSld>
+    <p:bg>
+      <p:bgPr>
+        <a:solidFill>
+          <a:schemeClr val="bg1"/>
+        </a:solidFill>
+        <a:effectLst/>
+      </p:bgPr>
+    </p:bg>
+    <p:spTree>
+      <p:nvGrpSpPr>
+        <p:cNvPr id="1" name=""/>
+        <p:cNvGrpSpPr/>
+        <p:nvPr/>
+      </p:nvGrpSpPr>
+      <p:grpSpPr>
+        <a:xfrm>
+          <a:off x="0" y="0"/>
+          <a:ext cx="0" cy="0"/>
+          <a:chOff x="0" y="0"/>
+          <a:chExt cx="0" cy="0"/>
+        </a:xfrm>
+      </p:grpSpPr>
+      <p:sp>
+        <p:nvSpPr>
+          <p:cNvPr id="2" name="Title 1">
+            <a:extLst>
+              <a:ext uri="{FF2B5EF4-FFF2-40B4-BE49-F238E27FC236}">
+                <a16:creationId xmlns:a16="http://schemas.microsoft.com/office/drawing/2014/main" id="{7A4919D0-F177-4BBA-9A0B-DBA69E2ED764}"/>
+              </a:ext>
+            </a:extLst>
+          </p:cNvPr>
+          <p:cNvSpPr>
+            <a:spLocks noGrp="1"/>
+          </p:cNvSpPr>
+          <p:nvPr>
+            <p:ph type="title"/>
+          </p:nvPr>
+        </p:nvSpPr>
+        <p:spPr/>
+        <p:txBody>
+          <a:bodyPr>
+            <a:normAutofit/>
+          </a:bodyPr>
+          <a:lstStyle/>
+          <a:p>
+            <a:pPr algn="ctr"/>
+            <a:r>
+              <a:rPr lang="en-US" dirty="0"/>
+              <a:t>Title Lorem Ipsum </a:t>
+            </a:r>
+          </a:p>
+        </p:txBody>
+      </p:sp>
+      <p:graphicFrame>
+        <p:nvGraphicFramePr>
+          <p:cNvPr id="5" name="Content Placeholder 2" descr="SmartArt graphic">
+            <a:extLst>
+              <a:ext uri="{FF2B5EF4-FFF2-40B4-BE49-F238E27FC236}">
+                <a16:creationId xmlns:a16="http://schemas.microsoft.com/office/drawing/2014/main" id="{91DB1382-7276-49FA-9632-38D558F457E3}"/>
+              </a:ext>
+            </a:extLst>
+          </p:cNvPr>
+          <p:cNvGraphicFramePr>
+            <a:graphicFrameLocks noGrp="1"/>
+          </p:cNvGraphicFramePr>
+          <p:nvPr>
+            <p:ph idx="1"/>
+            <p:extLst>
+              <p:ext uri="{D42A27DB-BD31-4B8C-83A1-F6EECF244321}">
+                <p14:modId xmlns:p14="http://schemas.microsoft.com/office/powerpoint/2010/main" val="3617019551"/>
+              </p:ext>
+            </p:extLst>
+          </p:nvPr>
+        </p:nvGraphicFramePr>
+        <p:xfrm>
+          <a:off x="1066800" y="2310063"/>
+          <a:ext cx="10058400" cy="3725612"/>
+        </p:xfrm>
+        <a:graphic>
+          <a:graphicData uri="http://schemas.openxmlformats.org/drawingml/2006/diagram">
+            <dgm:relIds xmlns:dgm="http://schemas.openxmlformats.org/drawingml/2006/diagram" xmlns:r="http://schemas.openxmlformats.org/officeDocument/2006/relationships" r:dm="rId2" r:lo="rId3" r:qs="rId4" r:cs="rId5"/>
+          </a:graphicData>
+        </a:graphic>
+      </p:graphicFrame>
+    </p:spTree>
+    <p:extLst>
+      <p:ext uri="{BB962C8B-B14F-4D97-AF65-F5344CB8AC3E}">
+        <p14:creationId xmlns:p14="http://schemas.microsoft.com/office/powerpoint/2010/main" val="183243182"/>
+      </p:ext>
+    </p:extLst>
+  </p:cSld>
+  <p:clrMapOvr>
+    <a:masterClrMapping/>
+  </p:clrMapOvr>
+</p:sld>
+</file>
+
+<file path=ppt/slides/slide2.xml><?xml version="1.0" encoding="utf-8"?>
+<p:sld xmlns:a="http://schemas.openxmlformats.org/drawingml/2006/main" xmlns:r="http://schemas.openxmlformats.org/officeDocument/2006/relationships" xmlns:p="http://schemas.openxmlformats.org/presentationml/2006/main">
+  <p:cSld>
+    <p:bg>
+      <p:bgPr>
+        <a:solidFill>
+          <a:schemeClr val="bg1"/>
+        </a:solidFill>
+        <a:effectLst/>
+      </p:bgPr>
+    </p:bg>
+    <p:spTree>
+      <p:nvGrpSpPr>
+        <p:cNvPr id="1" name=""/>
+        <p:cNvGrpSpPr/>
+        <p:nvPr/>
+      </p:nvGrpSpPr>
+      <p:grpSpPr>
+        <a:xfrm>
+          <a:off x="0" y="0"/>
+          <a:ext cx="0" cy="0"/>
+          <a:chOff x="0" y="0"/>
+          <a:chExt cx="0" cy="0"/>
+        </a:xfrm>
+      </p:grpSpPr>
+      <p:sp useBgFill="1">
+        <p:nvSpPr>
+          <p:cNvPr id="24" name="Rectangle 7">
+            <a:extLst>
+              <a:ext uri="{FF2B5EF4-FFF2-40B4-BE49-F238E27FC236}">
+                <a16:creationId xmlns:a16="http://schemas.microsoft.com/office/drawing/2014/main" id="{B373F125-DEF3-41D6-9918-AB21A2ACC37A}"/>
+              </a:ext>
+              <a:ext uri="{C183D7F6-B498-43B3-948B-1728B52AA6E4}">
+                <adec:decorative xmlns:adec="http://schemas.microsoft.com/office/drawing/2017/decorative" val="1"/>
+              </a:ext>
+            </a:extLst>
+          </p:cNvPr>
+          <p:cNvSpPr>
+            <a:spLocks noGrp="1" noRot="1" noChangeAspect="1" noMove="1" noResize="1" noEditPoints="1" noAdjustHandles="1" noChangeArrowheads="1" noChangeShapeType="1" noTextEdit="1"/>
+          </p:cNvSpPr>
+          <p:nvPr>
+            <p:extLst>
+              <p:ext uri="{386F3935-93C4-4BCD-93E2-E3B085C9AB24}">
+                <p16:designElem xmlns:p16="http://schemas.microsoft.com/office/powerpoint/2015/main" val="1"/>
+              </p:ext>
+            </p:extLst>
+          </p:nvPr>
+        </p:nvSpPr>
+        <p:spPr>
+          <a:xfrm>
+            <a:off x="0" y="0"/>
+            <a:ext cx="12192000" cy="6858000"/>
+          </a:xfrm>
+          <a:prstGeom prst="rect">
+            <a:avLst/>
+          </a:prstGeom>
+          <a:ln>
+            <a:noFill/>
+          </a:ln>
+        </p:spPr>
+        <p:style>
+          <a:lnRef idx="2">
+            <a:schemeClr val="accent1">
+              <a:shade val="50000"/>
+            </a:schemeClr>
+          </a:lnRef>
+          <a:fillRef idx="1">
+            <a:schemeClr val="accent1"/>
+          </a:fillRef>
+          <a:effectRef idx="0">
+            <a:schemeClr val="accent1"/>
+          </a:effectRef>
+          <a:fontRef idx="minor">
+            <a:schemeClr val="lt1"/>
+          </a:fontRef>
+        </p:style>
+        <p:txBody>
+          <a:bodyPr rtlCol="0" anchor="ctr"/>
+          <a:lstStyle/>
+          <a:p>
+            <a:pPr algn="ctr"/>
+            <a:endParaRPr lang="en-US"/>
+          </a:p>
+        </p:txBody>
+      </p:sp>
+      <p:sp>
+        <p:nvSpPr>
+          <p:cNvPr id="25" name="Rectangle 9">
+            <a:extLst>
+              <a:ext uri="{FF2B5EF4-FFF2-40B4-BE49-F238E27FC236}">
+                <a16:creationId xmlns:a16="http://schemas.microsoft.com/office/drawing/2014/main" id="{71E9F226-EB6E-48C9-ADDA-636DE4BF4EBE}"/>
+              </a:ext>
+              <a:ext uri="{C183D7F6-B498-43B3-948B-1728B52AA6E4}">
+                <adec:decorative xmlns:adec="http://schemas.microsoft.com/office/drawing/2017/decorative" val="1"/>
+              </a:ext>
+            </a:extLst>
+          </p:cNvPr>
+          <p:cNvSpPr>
+            <a:spLocks noGrp="1" noRot="1" noChangeAspect="1" noMove="1" noResize="1" noEditPoints="1" noAdjustHandles="1" noChangeArrowheads="1" noChangeShapeType="1" noTextEdit="1"/>
+          </p:cNvSpPr>
+          <p:nvPr>
+            <p:extLst>
+              <p:ext uri="{386F3935-93C4-4BCD-93E2-E3B085C9AB24}">
+                <p16:designElem xmlns:p16="http://schemas.microsoft.com/office/powerpoint/2015/main" val="1"/>
+              </p:ext>
+            </p:extLst>
+          </p:nvPr>
+        </p:nvSpPr>
+        <p:spPr>
+          <a:xfrm>
+            <a:off x="490581" y="485678"/>
+            <a:ext cx="4174743" cy="5888772"/>
+          </a:xfrm>
+          <a:prstGeom prst="rect">
+            <a:avLst/>
+          </a:prstGeom>
+          <a:ln>
+            <a:noFill/>
+          </a:ln>
+        </p:spPr>
+        <p:style>
+          <a:lnRef idx="2">
+            <a:schemeClr val="accent1">
+              <a:shade val="50000"/>
+            </a:schemeClr>
+          </a:lnRef>
+          <a:fillRef idx="1">
+            <a:schemeClr val="accent1"/>
+          </a:fillRef>
+          <a:effectRef idx="0">
+            <a:schemeClr val="accent1"/>
+          </a:effectRef>
+          <a:fontRef idx="minor">
+            <a:schemeClr val="lt1"/>
+          </a:fontRef>
+        </p:style>
+        <p:txBody>
+          <a:bodyPr rtlCol="0" anchor="ctr"/>
+          <a:lstStyle/>
+          <a:p>
+            <a:pPr algn="ctr"/>
+            <a:endParaRPr lang="en-US"/>
+          </a:p>
+        </p:txBody>
+      </p:sp>
+      <p:sp>
+        <p:nvSpPr>
+          <p:cNvPr id="2" name="Title 1">
+            <a:extLst>
+              <a:ext uri="{FF2B5EF4-FFF2-40B4-BE49-F238E27FC236}">
                 <a16:creationId xmlns:a16="http://schemas.microsoft.com/office/drawing/2014/main" id="{93BE06B3-6429-4F74-9D62-AEE2990EF98D}"/>
               </a:ext>
             </a:extLst>
@@ -7108,8 +7848,8 @@
         </p:nvSpPr>
         <p:spPr>
           <a:xfrm>
-            <a:off x="927916" y="1293873"/>
-            <a:ext cx="3269749" cy="4624327"/>
+            <a:off x="623321" y="1541073"/>
+            <a:ext cx="3909261" cy="3568192"/>
           </a:xfrm>
         </p:spPr>
         <p:txBody>
@@ -7118,13 +7858,16 @@
           </a:bodyPr>
           <a:lstStyle/>
           <a:p>
+            <a:pPr algn="ctr"/>
             <a:r>
               <a:rPr lang="en-US" sz="3000" dirty="0">
                 <a:solidFill>
                   <a:srgbClr val="FFFFFF"/>
                 </a:solidFill>
+                <a:latin typeface="Arial" panose="020B0604020202020204" pitchFamily="34" charset="0"/>
+                <a:cs typeface="Arial" panose="020B0604020202020204" pitchFamily="34" charset="0"/>
               </a:rPr>
-              <a:t>Introduction of Recommend System</a:t>
+              <a:t>Introduction To  Recommendation System</a:t>
             </a:r>
           </a:p>
         </p:txBody>
@@ -7158,19 +7901,70 @@
           <a:lstStyle/>
           <a:p>
             <a:r>
-              <a:rPr lang="en-US" dirty="0"/>
+              <a:rPr lang="en-US" dirty="0">
+                <a:latin typeface="Arial" panose="020B0604020202020204" pitchFamily="34" charset="0"/>
+                <a:cs typeface="Arial" panose="020B0604020202020204" pitchFamily="34" charset="0"/>
+              </a:rPr>
               <a:t> </a:t>
             </a:r>
             <a:r>
-              <a:rPr lang="en-US" sz="2000" dirty="0"/>
-              <a:t>Recommend system are important as they help them to make a right decision, without any cognitive resources</a:t>
-            </a:r>
-          </a:p>
-          <a:p>
-            <a:r>
-              <a:rPr lang="en-US" sz="2000" dirty="0"/>
-              <a:t>It’s are computer programs that  suggest recommendations to users depending on a variety of criteria.</a:t>
-            </a:r>
+              <a:rPr lang="en-US" sz="2000" dirty="0">
+                <a:highlight>
+                  <a:srgbClr val="F8D22F"/>
+                </a:highlight>
+                <a:latin typeface="Arial" panose="020B0604020202020204" pitchFamily="34" charset="0"/>
+                <a:cs typeface="Arial" panose="020B0604020202020204" pitchFamily="34" charset="0"/>
+              </a:rPr>
+              <a:t>Recommendation system </a:t>
+            </a:r>
+            <a:r>
+              <a:rPr lang="en-US" sz="2000" dirty="0">
+                <a:latin typeface="Arial" panose="020B0604020202020204" pitchFamily="34" charset="0"/>
+                <a:cs typeface="Arial" panose="020B0604020202020204" pitchFamily="34" charset="0"/>
+              </a:rPr>
+              <a:t>are important as they help the users to make a right decision, without any cognitive resources.</a:t>
+            </a:r>
+          </a:p>
+          <a:p>
+            <a:r>
+              <a:rPr lang="en-US" sz="2000" dirty="0">
+                <a:latin typeface="Arial" panose="020B0604020202020204" pitchFamily="34" charset="0"/>
+                <a:cs typeface="Arial" panose="020B0604020202020204" pitchFamily="34" charset="0"/>
+              </a:rPr>
+              <a:t>These are computer programs that  suggest recommendations to users depending on a variety of criteria.</a:t>
+            </a:r>
+          </a:p>
+          <a:p>
+            <a:r>
+              <a:rPr lang="en-US" sz="2000" dirty="0">
+                <a:latin typeface="Arial" panose="020B0604020202020204" pitchFamily="34" charset="0"/>
+                <a:cs typeface="Arial" panose="020B0604020202020204" pitchFamily="34" charset="0"/>
+              </a:rPr>
+              <a:t>In Simple words, it is an algorithm that </a:t>
+            </a:r>
+            <a:r>
+              <a:rPr lang="en-US" sz="2000" dirty="0">
+                <a:highlight>
+                  <a:srgbClr val="F8D22F"/>
+                </a:highlight>
+                <a:latin typeface="Arial" panose="020B0604020202020204" pitchFamily="34" charset="0"/>
+                <a:cs typeface="Arial" panose="020B0604020202020204" pitchFamily="34" charset="0"/>
+              </a:rPr>
+              <a:t>suggest relevant items</a:t>
+            </a:r>
+            <a:r>
+              <a:rPr lang="en-US" sz="2000" dirty="0">
+                <a:latin typeface="Arial" panose="020B0604020202020204" pitchFamily="34" charset="0"/>
+                <a:cs typeface="Arial" panose="020B0604020202020204" pitchFamily="34" charset="0"/>
+              </a:rPr>
+              <a:t> to users.</a:t>
+            </a:r>
+          </a:p>
+          <a:p>
+            <a:endParaRPr lang="en-US" sz="2000" dirty="0">
+              <a:latin typeface="Arial" panose="020B0604020202020204" pitchFamily="34" charset="0"/>
+              <a:cs typeface="Arial" panose="020B0604020202020204" pitchFamily="34" charset="0"/>
+            </a:endParaRPr>
           </a:p>
         </p:txBody>
       </p:sp>
@@ -7350,8 +8144,8 @@
         </p:nvSpPr>
         <p:spPr>
           <a:xfrm>
-            <a:off x="665019" y="1113764"/>
-            <a:ext cx="3563888" cy="4624327"/>
+            <a:off x="994368" y="1091677"/>
+            <a:ext cx="3119654" cy="4624327"/>
           </a:xfrm>
         </p:spPr>
         <p:txBody>
@@ -7360,19 +8154,26 @@
           </a:bodyPr>
           <a:lstStyle/>
           <a:p>
+            <a:pPr algn="ctr"/>
             <a:r>
               <a:rPr lang="en-US" sz="2400" b="1" i="0" dirty="0">
                 <a:effectLst/>
+                <a:latin typeface="Arial" panose="020B0604020202020204" pitchFamily="34" charset="0"/>
+                <a:cs typeface="Arial" panose="020B0604020202020204" pitchFamily="34" charset="0"/>
               </a:rPr>
               <a:t>Real-World examples</a:t>
             </a:r>
             <a:br>
-              <a:rPr lang="en-US" sz="2000" b="0" i="0" dirty="0">
+              <a:rPr lang="en-US" sz="2400" b="0" i="0" dirty="0">
                 <a:effectLst/>
-                <a:latin typeface="Poppins" panose="020B0502040204020203" pitchFamily="2" charset="0"/>
+                <a:latin typeface="Arial" panose="020B0604020202020204" pitchFamily="34" charset="0"/>
+                <a:cs typeface="Arial" panose="020B0604020202020204" pitchFamily="34" charset="0"/>
               </a:rPr>
             </a:br>
-            <a:endParaRPr lang="en-US" sz="3200" dirty="0"/>
+            <a:endParaRPr lang="en-US" sz="2400" dirty="0">
+              <a:latin typeface="Arial" panose="020B0604020202020204" pitchFamily="34" charset="0"/>
+              <a:cs typeface="Arial" panose="020B0604020202020204" pitchFamily="34" charset="0"/>
+            </a:endParaRPr>
           </a:p>
         </p:txBody>
       </p:sp>
@@ -7400,7 +8201,7 @@
         </p:blipFill>
         <p:spPr>
           <a:xfrm>
-            <a:off x="5806140" y="1091677"/>
+            <a:off x="5852932" y="485678"/>
             <a:ext cx="1691555" cy="1691555"/>
           </a:xfrm>
           <a:prstGeom prst="rect">
@@ -7422,7 +8223,7 @@
         </p:nvSpPr>
         <p:spPr>
           <a:xfrm>
-            <a:off x="7526678" y="1851636"/>
+            <a:off x="7573470" y="1245637"/>
             <a:ext cx="978408" cy="85818"/>
           </a:xfrm>
           <a:prstGeom prst="rightArrow">
@@ -7475,7 +8276,7 @@
         </p:nvSpPr>
         <p:spPr>
           <a:xfrm>
-            <a:off x="8805967" y="1690526"/>
+            <a:off x="8852759" y="1084527"/>
             <a:ext cx="2151632" cy="1015663"/>
           </a:xfrm>
           <a:prstGeom prst="rect">
@@ -7525,7 +8326,7 @@
         </p:blipFill>
         <p:spPr bwMode="auto">
           <a:xfrm>
-            <a:off x="5835123" y="2308503"/>
+            <a:off x="5881915" y="1702504"/>
             <a:ext cx="1727854" cy="1691555"/>
           </a:xfrm>
           <a:prstGeom prst="rect">
@@ -7557,7 +8358,7 @@
         </p:nvSpPr>
         <p:spPr>
           <a:xfrm>
-            <a:off x="7562977" y="3142796"/>
+            <a:off x="7609769" y="2536797"/>
             <a:ext cx="978408" cy="85818"/>
           </a:xfrm>
           <a:prstGeom prst="rightArrow">
@@ -7610,7 +8411,7 @@
         </p:nvSpPr>
         <p:spPr>
           <a:xfrm>
-            <a:off x="8805967" y="2975029"/>
+            <a:off x="8852759" y="2369030"/>
             <a:ext cx="2151632" cy="707886"/>
           </a:xfrm>
           <a:prstGeom prst="rect">
@@ -7653,7 +8454,7 @@
         </p:blipFill>
         <p:spPr>
           <a:xfrm>
-            <a:off x="5835123" y="3630533"/>
+            <a:off x="5881915" y="3024534"/>
             <a:ext cx="1691555" cy="1234764"/>
           </a:xfrm>
           <a:prstGeom prst="rect">
@@ -7675,7 +8476,7 @@
         </p:nvSpPr>
         <p:spPr>
           <a:xfrm>
-            <a:off x="7562977" y="4203048"/>
+            <a:off x="7609769" y="3597049"/>
             <a:ext cx="978408" cy="85818"/>
           </a:xfrm>
           <a:prstGeom prst="rightArrow">
@@ -7728,7 +8529,7 @@
         </p:nvSpPr>
         <p:spPr>
           <a:xfrm>
-            <a:off x="8696477" y="4042772"/>
+            <a:off x="8743269" y="3436773"/>
             <a:ext cx="1934661" cy="707886"/>
           </a:xfrm>
           <a:prstGeom prst="rect">
@@ -7771,7 +8572,7 @@
         </p:blipFill>
         <p:spPr>
           <a:xfrm>
-            <a:off x="5969634" y="4935793"/>
+            <a:off x="6016426" y="4329794"/>
             <a:ext cx="1364566" cy="900888"/>
           </a:xfrm>
           <a:prstGeom prst="rect">
@@ -7793,7 +8594,7 @@
         </p:nvSpPr>
         <p:spPr>
           <a:xfrm>
-            <a:off x="7562977" y="5386120"/>
+            <a:off x="7609769" y="4780121"/>
             <a:ext cx="978408" cy="85818"/>
           </a:xfrm>
           <a:prstGeom prst="rightArrow">
@@ -7846,7 +8647,7 @@
         </p:nvSpPr>
         <p:spPr>
           <a:xfrm flipH="1">
-            <a:off x="8805967" y="5204164"/>
+            <a:off x="8852759" y="4598165"/>
             <a:ext cx="1364566" cy="400110"/>
           </a:xfrm>
           <a:prstGeom prst="rect">
@@ -7913,11 +8714,19 @@
             <p:ph type="title"/>
           </p:nvPr>
         </p:nvSpPr>
-        <p:spPr/>
-        <p:txBody>
-          <a:bodyPr/>
+        <p:spPr>
+          <a:xfrm>
+            <a:off x="581192" y="914400"/>
+            <a:ext cx="11029616" cy="518092"/>
+          </a:xfrm>
+        </p:spPr>
+        <p:txBody>
+          <a:bodyPr>
+            <a:normAutofit fontScale="90000"/>
+          </a:bodyPr>
           <a:lstStyle/>
           <a:p>
+            <a:pPr algn="ctr"/>
             <a:r>
               <a:rPr lang="en-US" dirty="0"/>
               <a:t>Types of recommendation systems</a:t>
@@ -7927,120 +8736,430 @@
       </p:sp>
       <p:sp>
         <p:nvSpPr>
-          <p:cNvPr id="3" name="Content Placeholder 2">
+          <p:cNvPr id="4" name="Oval 3">
             <a:extLst>
               <a:ext uri="{FF2B5EF4-FFF2-40B4-BE49-F238E27FC236}">
-                <a16:creationId xmlns:a16="http://schemas.microsoft.com/office/drawing/2014/main" id="{97EDAEAE-506D-46CC-AF04-50B3D016C696}"/>
+                <a16:creationId xmlns:a16="http://schemas.microsoft.com/office/drawing/2014/main" id="{5353C44F-2E6D-4093-9100-472CDFFFD5AE}"/>
               </a:ext>
             </a:extLst>
           </p:cNvPr>
-          <p:cNvSpPr>
-            <a:spLocks noGrp="1"/>
-          </p:cNvSpPr>
-          <p:nvPr>
-            <p:ph idx="1"/>
-          </p:nvPr>
-        </p:nvSpPr>
-        <p:spPr/>
-        <p:txBody>
-          <a:bodyPr/>
+          <p:cNvSpPr/>
+          <p:nvPr/>
+        </p:nvSpPr>
+        <p:spPr>
+          <a:xfrm>
+            <a:off x="877824" y="2743200"/>
+            <a:ext cx="2834640" cy="2834640"/>
+          </a:xfrm>
+          <a:prstGeom prst="ellipse">
+            <a:avLst/>
+          </a:prstGeom>
+        </p:spPr>
+        <p:style>
+          <a:lnRef idx="2">
+            <a:schemeClr val="accent1">
+              <a:shade val="50000"/>
+            </a:schemeClr>
+          </a:lnRef>
+          <a:fillRef idx="1">
+            <a:schemeClr val="accent1"/>
+          </a:fillRef>
+          <a:effectRef idx="0">
+            <a:schemeClr val="accent1"/>
+          </a:effectRef>
+          <a:fontRef idx="minor">
+            <a:schemeClr val="lt1"/>
+          </a:fontRef>
+        </p:style>
+        <p:txBody>
+          <a:bodyPr rtlCol="0" anchor="ctr"/>
           <a:lstStyle/>
           <a:p>
-            <a:pPr rtl="0">
-              <a:lnSpc>
-                <a:spcPct val="200000"/>
-              </a:lnSpc>
-              <a:spcBef>
-                <a:spcPts val="0"/>
-              </a:spcBef>
-              <a:spcAft>
-                <a:spcPts val="0"/>
-              </a:spcAft>
-            </a:pPr>
-            <a:r>
-              <a:rPr lang="en-US" sz="2400" b="0" i="0" u="none" strike="noStrike" dirty="0">
-                <a:solidFill>
-                  <a:srgbClr val="000000"/>
-                </a:solidFill>
-                <a:effectLst/>
-              </a:rPr>
-              <a:t>Popularity based Recommendation System</a:t>
-            </a:r>
-          </a:p>
-          <a:p>
-            <a:pPr rtl="0">
-              <a:lnSpc>
-                <a:spcPct val="200000"/>
-              </a:lnSpc>
-              <a:spcBef>
-                <a:spcPts val="0"/>
-              </a:spcBef>
-              <a:spcAft>
-                <a:spcPts val="0"/>
-              </a:spcAft>
-            </a:pPr>
-            <a:r>
-              <a:rPr lang="en-US" sz="2400" dirty="0">
-                <a:solidFill>
-                  <a:srgbClr val="000000"/>
-                </a:solidFill>
-              </a:rPr>
-              <a:t>Collaborative Recommendation System</a:t>
-            </a:r>
-          </a:p>
-          <a:p>
-            <a:pPr rtl="0">
-              <a:lnSpc>
-                <a:spcPct val="200000"/>
-              </a:lnSpc>
-              <a:spcBef>
-                <a:spcPts val="0"/>
-              </a:spcBef>
-              <a:spcAft>
-                <a:spcPts val="0"/>
-              </a:spcAft>
-            </a:pPr>
-            <a:r>
-              <a:rPr lang="en-US" sz="2400" b="0" i="0" u="none" strike="noStrike" dirty="0">
-                <a:solidFill>
-                  <a:srgbClr val="000000"/>
-                </a:solidFill>
-                <a:effectLst/>
-              </a:rPr>
-              <a:t>Content based Recommendation System</a:t>
-            </a:r>
-            <a:br>
-              <a:rPr lang="en-US" sz="2400" b="0" i="0" u="none" strike="noStrike" dirty="0">
-                <a:solidFill>
-                  <a:srgbClr val="000000"/>
-                </a:solidFill>
-                <a:effectLst/>
-                <a:latin typeface="Arial" panose="020B0604020202020204" pitchFamily="34" charset="0"/>
-              </a:rPr>
-            </a:br>
-            <a:endParaRPr lang="en-US" sz="2400" b="0" i="0" u="none" strike="noStrike" dirty="0">
-              <a:solidFill>
-                <a:srgbClr val="000000"/>
-              </a:solidFill>
-              <a:effectLst/>
-              <a:latin typeface="Arial" panose="020B0604020202020204" pitchFamily="34" charset="0"/>
-            </a:endParaRPr>
-          </a:p>
-          <a:p>
-            <a:pPr rtl="0">
-              <a:spcBef>
-                <a:spcPts val="0"/>
-              </a:spcBef>
-              <a:spcAft>
-                <a:spcPts val="0"/>
-              </a:spcAft>
-            </a:pPr>
-            <a:endParaRPr lang="en-US" b="0" dirty="0">
-              <a:effectLst/>
-            </a:endParaRPr>
-          </a:p>
-        </p:txBody>
-      </p:sp>
+            <a:pPr algn="ctr"/>
+            <a:r>
+              <a:rPr lang="en-IN" sz="2800" dirty="0"/>
+              <a:t>Popularity based</a:t>
+            </a:r>
+          </a:p>
+        </p:txBody>
+      </p:sp>
+      <p:sp>
+        <p:nvSpPr>
+          <p:cNvPr id="5" name="Oval 4">
+            <a:extLst>
+              <a:ext uri="{FF2B5EF4-FFF2-40B4-BE49-F238E27FC236}">
+                <a16:creationId xmlns:a16="http://schemas.microsoft.com/office/drawing/2014/main" id="{79A9F797-EC3F-42D5-B676-13DEAD6DD888}"/>
+              </a:ext>
+            </a:extLst>
+          </p:cNvPr>
+          <p:cNvSpPr/>
+          <p:nvPr/>
+        </p:nvSpPr>
+        <p:spPr>
+          <a:xfrm>
+            <a:off x="4678680" y="2743200"/>
+            <a:ext cx="2834640" cy="2834640"/>
+          </a:xfrm>
+          <a:prstGeom prst="ellipse">
+            <a:avLst/>
+          </a:prstGeom>
+        </p:spPr>
+        <p:style>
+          <a:lnRef idx="2">
+            <a:schemeClr val="accent1">
+              <a:shade val="50000"/>
+            </a:schemeClr>
+          </a:lnRef>
+          <a:fillRef idx="1">
+            <a:schemeClr val="accent1"/>
+          </a:fillRef>
+          <a:effectRef idx="0">
+            <a:schemeClr val="accent1"/>
+          </a:effectRef>
+          <a:fontRef idx="minor">
+            <a:schemeClr val="lt1"/>
+          </a:fontRef>
+        </p:style>
+        <p:txBody>
+          <a:bodyPr rtlCol="0" anchor="ctr"/>
+          <a:lstStyle/>
+          <a:p>
+            <a:pPr algn="ctr"/>
+            <a:r>
+              <a:rPr lang="en-IN" sz="2400" dirty="0"/>
+              <a:t>Collaborative</a:t>
+            </a:r>
+          </a:p>
+        </p:txBody>
+      </p:sp>
+      <p:sp>
+        <p:nvSpPr>
+          <p:cNvPr id="6" name="Oval 5">
+            <a:extLst>
+              <a:ext uri="{FF2B5EF4-FFF2-40B4-BE49-F238E27FC236}">
+                <a16:creationId xmlns:a16="http://schemas.microsoft.com/office/drawing/2014/main" id="{F0FD10FF-EC94-4EF8-B7BD-8268A8319C55}"/>
+              </a:ext>
+            </a:extLst>
+          </p:cNvPr>
+          <p:cNvSpPr/>
+          <p:nvPr/>
+        </p:nvSpPr>
+        <p:spPr>
+          <a:xfrm>
+            <a:off x="8552688" y="2743200"/>
+            <a:ext cx="2834640" cy="2834640"/>
+          </a:xfrm>
+          <a:prstGeom prst="ellipse">
+            <a:avLst/>
+          </a:prstGeom>
+        </p:spPr>
+        <p:style>
+          <a:lnRef idx="2">
+            <a:schemeClr val="accent1">
+              <a:shade val="50000"/>
+            </a:schemeClr>
+          </a:lnRef>
+          <a:fillRef idx="1">
+            <a:schemeClr val="accent1"/>
+          </a:fillRef>
+          <a:effectRef idx="0">
+            <a:schemeClr val="accent1"/>
+          </a:effectRef>
+          <a:fontRef idx="minor">
+            <a:schemeClr val="lt1"/>
+          </a:fontRef>
+        </p:style>
+        <p:txBody>
+          <a:bodyPr rtlCol="0" anchor="ctr"/>
+          <a:lstStyle/>
+          <a:p>
+            <a:pPr algn="ctr"/>
+            <a:r>
+              <a:rPr lang="en-IN" sz="2800" dirty="0"/>
+              <a:t>Content based</a:t>
+            </a:r>
+          </a:p>
+        </p:txBody>
+      </p:sp>
+      <mc:AlternateContent xmlns:mc="http://schemas.openxmlformats.org/markup-compatibility/2006">
+        <mc:Choice xmlns:pslz="http://schemas.microsoft.com/office/powerpoint/2016/slidezoom" Requires="pslz">
+          <p:graphicFrame>
+            <p:nvGraphicFramePr>
+              <p:cNvPr id="10" name="Slide Zoom 9">
+                <a:extLst>
+                  <a:ext uri="{FF2B5EF4-FFF2-40B4-BE49-F238E27FC236}">
+                    <a16:creationId xmlns:a16="http://schemas.microsoft.com/office/drawing/2014/main" id="{5F20BCE3-153A-43E9-AA0B-605F34E70D27}"/>
+                  </a:ext>
+                </a:extLst>
+              </p:cNvPr>
+              <p:cNvGraphicFramePr>
+                <a:graphicFrameLocks noChangeAspect="1"/>
+              </p:cNvGraphicFramePr>
+              <p:nvPr>
+                <p:extLst>
+                  <p:ext uri="{D42A27DB-BD31-4B8C-83A1-F6EECF244321}">
+                    <p14:modId xmlns:p14="http://schemas.microsoft.com/office/powerpoint/2010/main" val="2181357095"/>
+                  </p:ext>
+                </p:extLst>
+              </p:nvPr>
+            </p:nvGraphicFramePr>
+            <p:xfrm>
+              <a:off x="1143953" y="2910459"/>
+              <a:ext cx="2237994" cy="2237994"/>
+            </p:xfrm>
+            <a:graphic>
+              <a:graphicData uri="http://schemas.microsoft.com/office/powerpoint/2016/slidezoom">
+                <pslz:sldZm>
+                  <pslz:sldZmObj sldId="270" cId="630271234">
+                    <pslz:zmPr id="{2C6F3656-C7E0-4555-9425-5D276DC790D1}" imageType="cover" transitionDur="1000">
+                      <p166:blipFill xmlns:p166="http://schemas.microsoft.com/office/powerpoint/2016/6/main">
+                        <a:blip r:embed="rId2"/>
+                        <a:stretch>
+                          <a:fillRect/>
+                        </a:stretch>
+                      </p166:blipFill>
+                      <p166:spPr xmlns:p166="http://schemas.microsoft.com/office/powerpoint/2016/6/main">
+                        <a:xfrm>
+                          <a:off x="0" y="0"/>
+                          <a:ext cx="2237994" cy="2237994"/>
+                        </a:xfrm>
+                        <a:prstGeom prst="rect">
+                          <a:avLst/>
+                        </a:prstGeom>
+                        <a:ln w="3175">
+                          <a:noFill/>
+                        </a:ln>
+                      </p166:spPr>
+                    </pslz:zmPr>
+                  </pslz:sldZmObj>
+                </pslz:sldZm>
+              </a:graphicData>
+            </a:graphic>
+          </p:graphicFrame>
+        </mc:Choice>
+        <mc:Fallback>
+          <p:pic>
+            <p:nvPicPr>
+              <p:cNvPr id="10" name="Slide Zoom 9">
+                <a:hlinkClick r:id="rId3" action="ppaction://hlinksldjump"/>
+                <a:extLst>
+                  <a:ext uri="{FF2B5EF4-FFF2-40B4-BE49-F238E27FC236}">
+                    <a16:creationId xmlns:a16="http://schemas.microsoft.com/office/drawing/2014/main" id="{5F20BCE3-153A-43E9-AA0B-605F34E70D27}"/>
+                  </a:ext>
+                </a:extLst>
+              </p:cNvPr>
+              <p:cNvPicPr>
+                <a:picLocks noGrp="1" noRot="1" noChangeAspect="1" noMove="1" noResize="1" noEditPoints="1" noAdjustHandles="1" noChangeArrowheads="1" noChangeShapeType="1"/>
+              </p:cNvPicPr>
+              <p:nvPr/>
+            </p:nvPicPr>
+            <p:blipFill>
+              <a:blip r:embed="rId2"/>
+              <a:stretch>
+                <a:fillRect/>
+              </a:stretch>
+            </p:blipFill>
+            <p:spPr>
+              <a:xfrm>
+                <a:off x="1143953" y="2910459"/>
+                <a:ext cx="2237994" cy="2237994"/>
+              </a:xfrm>
+              <a:prstGeom prst="rect">
+                <a:avLst/>
+              </a:prstGeom>
+              <a:ln w="3175">
+                <a:noFill/>
+              </a:ln>
+            </p:spPr>
+          </p:pic>
+        </mc:Fallback>
+      </mc:AlternateContent>
+      <mc:AlternateContent xmlns:mc="http://schemas.openxmlformats.org/markup-compatibility/2006">
+        <mc:Choice xmlns:pslz="http://schemas.microsoft.com/office/powerpoint/2016/slidezoom" Requires="pslz">
+          <p:graphicFrame>
+            <p:nvGraphicFramePr>
+              <p:cNvPr id="13" name="Slide Zoom 12">
+                <a:extLst>
+                  <a:ext uri="{FF2B5EF4-FFF2-40B4-BE49-F238E27FC236}">
+                    <a16:creationId xmlns:a16="http://schemas.microsoft.com/office/drawing/2014/main" id="{AF3B6220-320A-4832-AD81-8BDDBA4FD38A}"/>
+                  </a:ext>
+                </a:extLst>
+              </p:cNvPr>
+              <p:cNvGraphicFramePr>
+                <a:graphicFrameLocks noChangeAspect="1"/>
+              </p:cNvGraphicFramePr>
+              <p:nvPr>
+                <p:extLst>
+                  <p:ext uri="{D42A27DB-BD31-4B8C-83A1-F6EECF244321}">
+                    <p14:modId xmlns:p14="http://schemas.microsoft.com/office/powerpoint/2010/main" val="2872604933"/>
+                  </p:ext>
+                </p:extLst>
+              </p:nvPr>
+            </p:nvGraphicFramePr>
+            <p:xfrm>
+              <a:off x="4958715" y="3023235"/>
+              <a:ext cx="2274570" cy="2274570"/>
+            </p:xfrm>
+            <a:graphic>
+              <a:graphicData uri="http://schemas.microsoft.com/office/powerpoint/2016/slidezoom">
+                <pslz:sldZm>
+                  <pslz:sldZmObj sldId="271" cId="3091145718">
+                    <pslz:zmPr id="{B2534AEE-2289-44AA-891F-E26C8F109250}" imageType="cover" transitionDur="1000">
+                      <p166:blipFill xmlns:p166="http://schemas.microsoft.com/office/powerpoint/2016/6/main">
+                        <a:blip r:embed="rId2"/>
+                        <a:stretch>
+                          <a:fillRect/>
+                        </a:stretch>
+                      </p166:blipFill>
+                      <p166:spPr xmlns:p166="http://schemas.microsoft.com/office/powerpoint/2016/6/main">
+                        <a:xfrm>
+                          <a:off x="0" y="0"/>
+                          <a:ext cx="2274570" cy="2274570"/>
+                        </a:xfrm>
+                        <a:prstGeom prst="rect">
+                          <a:avLst/>
+                        </a:prstGeom>
+                        <a:ln w="3175">
+                          <a:noFill/>
+                        </a:ln>
+                      </p166:spPr>
+                    </pslz:zmPr>
+                  </pslz:sldZmObj>
+                </pslz:sldZm>
+              </a:graphicData>
+            </a:graphic>
+          </p:graphicFrame>
+        </mc:Choice>
+        <mc:Fallback>
+          <p:pic>
+            <p:nvPicPr>
+              <p:cNvPr id="13" name="Slide Zoom 12">
+                <a:hlinkClick r:id="rId4" action="ppaction://hlinksldjump"/>
+                <a:extLst>
+                  <a:ext uri="{FF2B5EF4-FFF2-40B4-BE49-F238E27FC236}">
+                    <a16:creationId xmlns:a16="http://schemas.microsoft.com/office/drawing/2014/main" id="{AF3B6220-320A-4832-AD81-8BDDBA4FD38A}"/>
+                  </a:ext>
+                </a:extLst>
+              </p:cNvPr>
+              <p:cNvPicPr>
+                <a:picLocks noGrp="1" noRot="1" noChangeAspect="1" noMove="1" noResize="1" noEditPoints="1" noAdjustHandles="1" noChangeArrowheads="1" noChangeShapeType="1"/>
+              </p:cNvPicPr>
+              <p:nvPr/>
+            </p:nvPicPr>
+            <p:blipFill>
+              <a:blip r:embed="rId2"/>
+              <a:stretch>
+                <a:fillRect/>
+              </a:stretch>
+            </p:blipFill>
+            <p:spPr>
+              <a:xfrm>
+                <a:off x="4958715" y="3023235"/>
+                <a:ext cx="2274570" cy="2274570"/>
+              </a:xfrm>
+              <a:prstGeom prst="rect">
+                <a:avLst/>
+              </a:prstGeom>
+              <a:ln w="3175">
+                <a:noFill/>
+              </a:ln>
+            </p:spPr>
+          </p:pic>
+        </mc:Fallback>
+      </mc:AlternateContent>
+      <mc:AlternateContent xmlns:mc="http://schemas.openxmlformats.org/markup-compatibility/2006">
+        <mc:Choice xmlns:pslz="http://schemas.microsoft.com/office/powerpoint/2016/slidezoom" Requires="pslz">
+          <p:graphicFrame>
+            <p:nvGraphicFramePr>
+              <p:cNvPr id="15" name="Slide Zoom 14">
+                <a:extLst>
+                  <a:ext uri="{FF2B5EF4-FFF2-40B4-BE49-F238E27FC236}">
+                    <a16:creationId xmlns:a16="http://schemas.microsoft.com/office/drawing/2014/main" id="{581B7128-051E-4898-986A-84F2BB40C789}"/>
+                  </a:ext>
+                </a:extLst>
+              </p:cNvPr>
+              <p:cNvGraphicFramePr>
+                <a:graphicFrameLocks noChangeAspect="1"/>
+              </p:cNvGraphicFramePr>
+              <p:nvPr>
+                <p:extLst>
+                  <p:ext uri="{D42A27DB-BD31-4B8C-83A1-F6EECF244321}">
+                    <p14:modId xmlns:p14="http://schemas.microsoft.com/office/powerpoint/2010/main" val="1612719876"/>
+                  </p:ext>
+                </p:extLst>
+              </p:nvPr>
+            </p:nvGraphicFramePr>
+            <p:xfrm>
+              <a:off x="8785479" y="2975991"/>
+              <a:ext cx="2369058" cy="2369058"/>
+            </p:xfrm>
+            <a:graphic>
+              <a:graphicData uri="http://schemas.microsoft.com/office/powerpoint/2016/slidezoom">
+                <pslz:sldZm>
+                  <pslz:sldZmObj sldId="272" cId="3251742453">
+                    <pslz:zmPr id="{731B731A-9020-487C-BD65-82B53F109D66}" imageType="cover" transitionDur="1000">
+                      <p166:blipFill xmlns:p166="http://schemas.microsoft.com/office/powerpoint/2016/6/main">
+                        <a:blip r:embed="rId2"/>
+                        <a:stretch>
+                          <a:fillRect/>
+                        </a:stretch>
+                      </p166:blipFill>
+                      <p166:spPr xmlns:p166="http://schemas.microsoft.com/office/powerpoint/2016/6/main">
+                        <a:xfrm>
+                          <a:off x="0" y="0"/>
+                          <a:ext cx="2369058" cy="2369058"/>
+                        </a:xfrm>
+                        <a:prstGeom prst="rect">
+                          <a:avLst/>
+                        </a:prstGeom>
+                        <a:ln w="3175">
+                          <a:noFill/>
+                        </a:ln>
+                      </p166:spPr>
+                    </pslz:zmPr>
+                  </pslz:sldZmObj>
+                </pslz:sldZm>
+              </a:graphicData>
+            </a:graphic>
+          </p:graphicFrame>
+        </mc:Choice>
+        <mc:Fallback>
+          <p:pic>
+            <p:nvPicPr>
+              <p:cNvPr id="15" name="Slide Zoom 14">
+                <a:hlinkClick r:id="rId5" action="ppaction://hlinksldjump"/>
+                <a:extLst>
+                  <a:ext uri="{FF2B5EF4-FFF2-40B4-BE49-F238E27FC236}">
+                    <a16:creationId xmlns:a16="http://schemas.microsoft.com/office/drawing/2014/main" id="{581B7128-051E-4898-986A-84F2BB40C789}"/>
+                  </a:ext>
+                </a:extLst>
+              </p:cNvPr>
+              <p:cNvPicPr>
+                <a:picLocks noGrp="1" noRot="1" noChangeAspect="1" noMove="1" noResize="1" noEditPoints="1" noAdjustHandles="1" noChangeArrowheads="1" noChangeShapeType="1"/>
+              </p:cNvPicPr>
+              <p:nvPr/>
+            </p:nvPicPr>
+            <p:blipFill>
+              <a:blip r:embed="rId2"/>
+              <a:stretch>
+                <a:fillRect/>
+              </a:stretch>
+            </p:blipFill>
+            <p:spPr>
+              <a:xfrm>
+                <a:off x="8785479" y="2975991"/>
+                <a:ext cx="2369058" cy="2369058"/>
+              </a:xfrm>
+              <a:prstGeom prst="rect">
+                <a:avLst/>
+              </a:prstGeom>
+              <a:ln w="3175">
+                <a:noFill/>
+              </a:ln>
+            </p:spPr>
+          </p:pic>
+        </mc:Fallback>
+      </mc:AlternateContent>
     </p:spTree>
     <p:extLst>
       <p:ext uri="{BB962C8B-B14F-4D97-AF65-F5344CB8AC3E}">
@@ -8076,7 +9195,7 @@
           <p:cNvPr id="2" name="Title 1">
             <a:extLst>
               <a:ext uri="{FF2B5EF4-FFF2-40B4-BE49-F238E27FC236}">
-                <a16:creationId xmlns:a16="http://schemas.microsoft.com/office/drawing/2014/main" id="{BBD28E1B-B302-416F-B72A-488EF37D3916}"/>
+                <a16:creationId xmlns:a16="http://schemas.microsoft.com/office/drawing/2014/main" id="{F58E4921-2BAD-4C70-BBDF-1477353D9E9D}"/>
               </a:ext>
             </a:extLst>
           </p:cNvPr>
@@ -8087,111 +9206,298 @@
             <p:ph type="title"/>
           </p:nvPr>
         </p:nvSpPr>
-        <p:spPr/>
+        <p:spPr>
+          <a:xfrm>
+            <a:off x="690920" y="950976"/>
+            <a:ext cx="11029616" cy="646108"/>
+          </a:xfrm>
+        </p:spPr>
         <p:txBody>
           <a:bodyPr/>
           <a:lstStyle/>
           <a:p>
-            <a:r>
-              <a:rPr lang="en-US" b="1" i="0" dirty="0">
-                <a:effectLst/>
-              </a:rPr>
-              <a:t> </a:t>
-            </a:r>
-            <a:r>
-              <a:rPr lang="en-US" i="0" dirty="0">
-                <a:effectLst/>
-              </a:rPr>
-              <a:t>COLD START PROBLEM</a:t>
-            </a:r>
-            <a:br>
-              <a:rPr lang="en-US" b="0" i="0" dirty="0">
-                <a:solidFill>
-                  <a:srgbClr val="292929"/>
-                </a:solidFill>
-                <a:effectLst/>
-                <a:latin typeface="sohne"/>
-              </a:rPr>
-            </a:br>
-            <a:endParaRPr lang="en-US" dirty="0"/>
-          </a:p>
-        </p:txBody>
-      </p:sp>
-      <p:sp>
-        <p:nvSpPr>
-          <p:cNvPr id="3" name="Content Placeholder 2">
+            <a:pPr algn="ctr"/>
+            <a:r>
+              <a:rPr lang="en-IN" dirty="0"/>
+              <a:t>Popularity based recommendation system</a:t>
+            </a:r>
+          </a:p>
+        </p:txBody>
+      </p:sp>
+      <p:sp>
+        <p:nvSpPr>
+          <p:cNvPr id="4" name="TextBox 3">
             <a:extLst>
               <a:ext uri="{FF2B5EF4-FFF2-40B4-BE49-F238E27FC236}">
-                <a16:creationId xmlns:a16="http://schemas.microsoft.com/office/drawing/2014/main" id="{3529DE2B-79BE-4135-A411-BB760D2406FB}"/>
+                <a16:creationId xmlns:a16="http://schemas.microsoft.com/office/drawing/2014/main" id="{527D2A5B-04B3-478B-A445-D8824E83657D}"/>
               </a:ext>
             </a:extLst>
           </p:cNvPr>
-          <p:cNvSpPr>
-            <a:spLocks noGrp="1"/>
-          </p:cNvSpPr>
-          <p:nvPr>
-            <p:ph idx="1"/>
-          </p:nvPr>
-        </p:nvSpPr>
-        <p:spPr/>
-        <p:txBody>
-          <a:bodyPr/>
+          <p:cNvSpPr txBox="1"/>
+          <p:nvPr/>
+        </p:nvSpPr>
+        <p:spPr>
+          <a:xfrm>
+            <a:off x="1170432" y="2633472"/>
+            <a:ext cx="10550104" cy="646331"/>
+          </a:xfrm>
+          <a:prstGeom prst="rect">
+            <a:avLst/>
+          </a:prstGeom>
+          <a:noFill/>
+        </p:spPr>
+        <p:txBody>
+          <a:bodyPr wrap="square" rtlCol="0">
+            <a:spAutoFit/>
+          </a:bodyPr>
           <a:lstStyle/>
           <a:p>
             <a:r>
-              <a:rPr lang="en-US" sz="2000" b="0" i="0" dirty="0">
-                <a:solidFill>
-                  <a:srgbClr val="292929"/>
-                </a:solidFill>
-                <a:effectLst/>
-                <a:cs typeface="Arial" panose="020B0604020202020204" pitchFamily="34" charset="0"/>
-              </a:rPr>
-              <a:t>Cold start problem arises </a:t>
-            </a:r>
-            <a:r>
-              <a:rPr lang="en-US" sz="2000" b="0" i="0" dirty="0">
-                <a:solidFill>
-                  <a:srgbClr val="000000"/>
-                </a:solidFill>
-                <a:effectLst/>
-                <a:cs typeface="Arial" panose="020B0604020202020204" pitchFamily="34" charset="0"/>
-              </a:rPr>
-              <a:t>at the time of registration of new user or adding up new resource or item in the system.</a:t>
-            </a:r>
-          </a:p>
-          <a:p>
-            <a:r>
-              <a:rPr lang="en-US" sz="2000" dirty="0">
-                <a:solidFill>
-                  <a:srgbClr val="000000"/>
-                </a:solidFill>
-                <a:cs typeface="Arial" panose="020B0604020202020204" pitchFamily="34" charset="0"/>
-              </a:rPr>
-              <a:t>T</a:t>
-            </a:r>
-            <a:r>
-              <a:rPr lang="en-US" sz="2000" b="0" i="0" dirty="0">
-                <a:solidFill>
-                  <a:srgbClr val="000000"/>
-                </a:solidFill>
-                <a:effectLst/>
-                <a:cs typeface="Arial" panose="020B0604020202020204" pitchFamily="34" charset="0"/>
-              </a:rPr>
-              <a:t>here would be no information about user’s interest or his rating for any particular item in the system, and recommending appropriate item at that time to the new user is very challenging.</a:t>
-            </a:r>
-          </a:p>
-          <a:p>
-            <a:endParaRPr lang="en-US" dirty="0"/>
-          </a:p>
-          <a:p>
-            <a:endParaRPr lang="en-US" dirty="0"/>
+              <a:rPr lang="en-US" dirty="0"/>
+              <a:t>It is a type of recommendation system which works on the principle of popularity and or anything which is in trend. </a:t>
+            </a:r>
+            <a:endParaRPr lang="en-IN" dirty="0"/>
+          </a:p>
+        </p:txBody>
+      </p:sp>
+      <p:sp>
+        <p:nvSpPr>
+          <p:cNvPr id="5" name="Arrow: Right 4">
+            <a:extLst>
+              <a:ext uri="{FF2B5EF4-FFF2-40B4-BE49-F238E27FC236}">
+                <a16:creationId xmlns:a16="http://schemas.microsoft.com/office/drawing/2014/main" id="{EE494BA1-7313-4EFA-B177-1C67D1640270}"/>
+              </a:ext>
+            </a:extLst>
+          </p:cNvPr>
+          <p:cNvSpPr/>
+          <p:nvPr/>
+        </p:nvSpPr>
+        <p:spPr>
+          <a:xfrm>
+            <a:off x="896112" y="2746772"/>
+            <a:ext cx="274320" cy="210312"/>
+          </a:xfrm>
+          <a:prstGeom prst="rightArrow">
+            <a:avLst/>
+          </a:prstGeom>
+          <a:solidFill>
+            <a:schemeClr val="accent3">
+              <a:lumMod val="75000"/>
+            </a:schemeClr>
+          </a:solidFill>
+          <a:ln>
+            <a:noFill/>
+          </a:ln>
+        </p:spPr>
+        <p:style>
+          <a:lnRef idx="2">
+            <a:schemeClr val="accent1">
+              <a:shade val="50000"/>
+            </a:schemeClr>
+          </a:lnRef>
+          <a:fillRef idx="1">
+            <a:schemeClr val="accent1"/>
+          </a:fillRef>
+          <a:effectRef idx="0">
+            <a:schemeClr val="accent1"/>
+          </a:effectRef>
+          <a:fontRef idx="minor">
+            <a:schemeClr val="lt1"/>
+          </a:fontRef>
+        </p:style>
+        <p:txBody>
+          <a:bodyPr rtlCol="0" anchor="ctr"/>
+          <a:lstStyle/>
+          <a:p>
+            <a:pPr algn="ctr"/>
+            <a:endParaRPr lang="en-IN" dirty="0"/>
+          </a:p>
+        </p:txBody>
+      </p:sp>
+      <p:sp>
+        <p:nvSpPr>
+          <p:cNvPr id="6" name="TextBox 5">
+            <a:extLst>
+              <a:ext uri="{FF2B5EF4-FFF2-40B4-BE49-F238E27FC236}">
+                <a16:creationId xmlns:a16="http://schemas.microsoft.com/office/drawing/2014/main" id="{38935AD5-2845-446F-9066-BD1448B22461}"/>
+              </a:ext>
+            </a:extLst>
+          </p:cNvPr>
+          <p:cNvSpPr txBox="1"/>
+          <p:nvPr/>
+        </p:nvSpPr>
+        <p:spPr>
+          <a:xfrm>
+            <a:off x="1170432" y="3393103"/>
+            <a:ext cx="10550104" cy="646331"/>
+          </a:xfrm>
+          <a:prstGeom prst="rect">
+            <a:avLst/>
+          </a:prstGeom>
+          <a:noFill/>
+        </p:spPr>
+        <p:txBody>
+          <a:bodyPr wrap="square" rtlCol="0">
+            <a:spAutoFit/>
+          </a:bodyPr>
+          <a:lstStyle/>
+          <a:p>
+            <a:r>
+              <a:rPr lang="en-US" dirty="0"/>
+              <a:t>These systems check about the product or movie which are in trend or are most popular among the users and directly recommend those.</a:t>
+            </a:r>
+            <a:endParaRPr lang="en-IN" dirty="0"/>
+          </a:p>
+        </p:txBody>
+      </p:sp>
+      <p:sp>
+        <p:nvSpPr>
+          <p:cNvPr id="7" name="Arrow: Right 6">
+            <a:extLst>
+              <a:ext uri="{FF2B5EF4-FFF2-40B4-BE49-F238E27FC236}">
+                <a16:creationId xmlns:a16="http://schemas.microsoft.com/office/drawing/2014/main" id="{E2A4B6BC-8E74-47AB-B8F3-F6028069B133}"/>
+              </a:ext>
+            </a:extLst>
+          </p:cNvPr>
+          <p:cNvSpPr/>
+          <p:nvPr/>
+        </p:nvSpPr>
+        <p:spPr>
+          <a:xfrm>
+            <a:off x="896112" y="3506403"/>
+            <a:ext cx="274320" cy="210312"/>
+          </a:xfrm>
+          <a:prstGeom prst="rightArrow">
+            <a:avLst/>
+          </a:prstGeom>
+          <a:solidFill>
+            <a:schemeClr val="accent3">
+              <a:lumMod val="75000"/>
+            </a:schemeClr>
+          </a:solidFill>
+          <a:ln>
+            <a:noFill/>
+          </a:ln>
+        </p:spPr>
+        <p:style>
+          <a:lnRef idx="2">
+            <a:schemeClr val="accent1">
+              <a:shade val="50000"/>
+            </a:schemeClr>
+          </a:lnRef>
+          <a:fillRef idx="1">
+            <a:schemeClr val="accent1"/>
+          </a:fillRef>
+          <a:effectRef idx="0">
+            <a:schemeClr val="accent1"/>
+          </a:effectRef>
+          <a:fontRef idx="minor">
+            <a:schemeClr val="lt1"/>
+          </a:fontRef>
+        </p:style>
+        <p:txBody>
+          <a:bodyPr rtlCol="0" anchor="ctr"/>
+          <a:lstStyle/>
+          <a:p>
+            <a:pPr algn="ctr"/>
+            <a:endParaRPr lang="en-IN" dirty="0"/>
+          </a:p>
+        </p:txBody>
+      </p:sp>
+      <p:sp>
+        <p:nvSpPr>
+          <p:cNvPr id="8" name="TextBox 7">
+            <a:extLst>
+              <a:ext uri="{FF2B5EF4-FFF2-40B4-BE49-F238E27FC236}">
+                <a16:creationId xmlns:a16="http://schemas.microsoft.com/office/drawing/2014/main" id="{441BF7CE-AED0-446F-9977-EBE56CF62BC0}"/>
+              </a:ext>
+            </a:extLst>
+          </p:cNvPr>
+          <p:cNvSpPr txBox="1"/>
+          <p:nvPr/>
+        </p:nvSpPr>
+        <p:spPr>
+          <a:xfrm>
+            <a:off x="1170432" y="4108372"/>
+            <a:ext cx="10550104" cy="923330"/>
+          </a:xfrm>
+          <a:prstGeom prst="rect">
+            <a:avLst/>
+          </a:prstGeom>
+          <a:noFill/>
+        </p:spPr>
+        <p:txBody>
+          <a:bodyPr wrap="square" rtlCol="0">
+            <a:spAutoFit/>
+          </a:bodyPr>
+          <a:lstStyle/>
+          <a:p>
+            <a:r>
+              <a:rPr lang="en-US" dirty="0"/>
+              <a:t> If a product is often purchased by most people then the system will get to know that that product is most popular so for every new user who just signed it, the system will recommend that product to that user also and chances becomes high that the new user will also purchase that. </a:t>
+            </a:r>
+            <a:endParaRPr lang="en-IN" dirty="0"/>
+          </a:p>
+        </p:txBody>
+      </p:sp>
+      <p:sp>
+        <p:nvSpPr>
+          <p:cNvPr id="9" name="Arrow: Right 8">
+            <a:extLst>
+              <a:ext uri="{FF2B5EF4-FFF2-40B4-BE49-F238E27FC236}">
+                <a16:creationId xmlns:a16="http://schemas.microsoft.com/office/drawing/2014/main" id="{9B6BDF80-C438-4E50-821B-A8209F40F029}"/>
+              </a:ext>
+            </a:extLst>
+          </p:cNvPr>
+          <p:cNvSpPr/>
+          <p:nvPr/>
+        </p:nvSpPr>
+        <p:spPr>
+          <a:xfrm>
+            <a:off x="896112" y="4221672"/>
+            <a:ext cx="274320" cy="210312"/>
+          </a:xfrm>
+          <a:prstGeom prst="rightArrow">
+            <a:avLst/>
+          </a:prstGeom>
+          <a:solidFill>
+            <a:schemeClr val="accent3">
+              <a:lumMod val="75000"/>
+            </a:schemeClr>
+          </a:solidFill>
+          <a:ln>
+            <a:noFill/>
+          </a:ln>
+        </p:spPr>
+        <p:style>
+          <a:lnRef idx="2">
+            <a:schemeClr val="accent1">
+              <a:shade val="50000"/>
+            </a:schemeClr>
+          </a:lnRef>
+          <a:fillRef idx="1">
+            <a:schemeClr val="accent1"/>
+          </a:fillRef>
+          <a:effectRef idx="0">
+            <a:schemeClr val="accent1"/>
+          </a:effectRef>
+          <a:fontRef idx="minor">
+            <a:schemeClr val="lt1"/>
+          </a:fontRef>
+        </p:style>
+        <p:txBody>
+          <a:bodyPr rtlCol="0" anchor="ctr"/>
+          <a:lstStyle/>
+          <a:p>
+            <a:pPr algn="ctr"/>
+            <a:endParaRPr lang="en-IN" dirty="0"/>
           </a:p>
         </p:txBody>
       </p:sp>
     </p:spTree>
     <p:extLst>
       <p:ext uri="{BB962C8B-B14F-4D97-AF65-F5344CB8AC3E}">
-        <p14:creationId xmlns:p14="http://schemas.microsoft.com/office/powerpoint/2010/main" val="150825481"/>
+        <p14:creationId xmlns:p14="http://schemas.microsoft.com/office/powerpoint/2010/main" val="630271234"/>
       </p:ext>
     </p:extLst>
   </p:cSld>
@@ -8223,7 +9529,7 @@
           <p:cNvPr id="2" name="Title 1">
             <a:extLst>
               <a:ext uri="{FF2B5EF4-FFF2-40B4-BE49-F238E27FC236}">
-                <a16:creationId xmlns:a16="http://schemas.microsoft.com/office/drawing/2014/main" id="{833FE25B-50B9-4C64-8685-D9D5CD928579}"/>
+                <a16:creationId xmlns:a16="http://schemas.microsoft.com/office/drawing/2014/main" id="{F58E4921-2BAD-4C70-BBDF-1477353D9E9D}"/>
               </a:ext>
             </a:extLst>
           </p:cNvPr>
@@ -8234,166 +9540,85 @@
             <p:ph type="title"/>
           </p:nvPr>
         </p:nvSpPr>
-        <p:spPr/>
+        <p:spPr>
+          <a:xfrm>
+            <a:off x="690920" y="950976"/>
+            <a:ext cx="11029616" cy="646108"/>
+          </a:xfrm>
+        </p:spPr>
         <p:txBody>
           <a:bodyPr/>
           <a:lstStyle/>
           <a:p>
-            <a:r>
-              <a:rPr lang="en-US" dirty="0"/>
-              <a:t>Types of cold start problem</a:t>
-            </a:r>
-          </a:p>
-        </p:txBody>
-      </p:sp>
-      <p:sp>
-        <p:nvSpPr>
-          <p:cNvPr id="3" name="Content Placeholder 2">
+            <a:pPr algn="ctr"/>
+            <a:r>
+              <a:rPr lang="en-IN" dirty="0"/>
+              <a:t>Collaborative recommendation system</a:t>
+            </a:r>
+          </a:p>
+        </p:txBody>
+      </p:sp>
+      <p:sp>
+        <p:nvSpPr>
+          <p:cNvPr id="4" name="TextBox 3">
             <a:extLst>
               <a:ext uri="{FF2B5EF4-FFF2-40B4-BE49-F238E27FC236}">
-                <a16:creationId xmlns:a16="http://schemas.microsoft.com/office/drawing/2014/main" id="{A409F203-CDB1-48CD-B3DF-887636D0F60E}"/>
+                <a16:creationId xmlns:a16="http://schemas.microsoft.com/office/drawing/2014/main" id="{527D2A5B-04B3-478B-A445-D8824E83657D}"/>
               </a:ext>
             </a:extLst>
           </p:cNvPr>
-          <p:cNvSpPr>
-            <a:spLocks noGrp="1"/>
-          </p:cNvSpPr>
-          <p:nvPr>
-            <p:ph idx="1"/>
-          </p:nvPr>
-        </p:nvSpPr>
-        <p:spPr/>
-        <p:txBody>
-          <a:bodyPr/>
-          <a:lstStyle/>
-          <a:p>
-            <a:r>
-              <a:rPr lang="en-US" sz="2400" i="0" dirty="0">
-                <a:solidFill>
-                  <a:srgbClr val="292929"/>
-                </a:solidFill>
-                <a:effectLst/>
-                <a:cs typeface="Arial" panose="020B0604020202020204" pitchFamily="34" charset="0"/>
-              </a:rPr>
-              <a:t>New user </a:t>
-            </a:r>
-            <a:r>
-              <a:rPr lang="en-US" sz="2400" b="0" i="0" dirty="0">
-                <a:solidFill>
-                  <a:srgbClr val="292929"/>
-                </a:solidFill>
-                <a:effectLst/>
-                <a:cs typeface="Arial" panose="020B0604020202020204" pitchFamily="34" charset="0"/>
-              </a:rPr>
-              <a:t>(what to recommend?)</a:t>
-            </a:r>
-          </a:p>
-          <a:p>
-            <a:r>
-              <a:rPr lang="en-US" sz="2400" i="0" dirty="0">
-                <a:solidFill>
-                  <a:srgbClr val="292929"/>
-                </a:solidFill>
-                <a:effectLst/>
-                <a:cs typeface="Arial" panose="020B0604020202020204" pitchFamily="34" charset="0"/>
-              </a:rPr>
-              <a:t>New items </a:t>
-            </a:r>
-            <a:r>
-              <a:rPr lang="en-US" sz="2400" b="0" i="0" dirty="0">
-                <a:solidFill>
-                  <a:srgbClr val="292929"/>
-                </a:solidFill>
-                <a:effectLst/>
-                <a:cs typeface="Arial" panose="020B0604020202020204" pitchFamily="34" charset="0"/>
-              </a:rPr>
-              <a:t>(Whom to recommend?)</a:t>
-            </a:r>
-          </a:p>
-          <a:p>
-            <a:endParaRPr lang="en-US" sz="2400" b="0" i="0" dirty="0">
-              <a:solidFill>
-                <a:srgbClr val="292929"/>
-              </a:solidFill>
-              <a:effectLst/>
-              <a:latin typeface="Arial" panose="020B0604020202020204" pitchFamily="34" charset="0"/>
-              <a:cs typeface="Arial" panose="020B0604020202020204" pitchFamily="34" charset="0"/>
-            </a:endParaRPr>
-          </a:p>
-          <a:p>
-            <a:endParaRPr lang="en-US" dirty="0"/>
-          </a:p>
-        </p:txBody>
-      </p:sp>
-    </p:spTree>
-    <p:extLst>
-      <p:ext uri="{BB962C8B-B14F-4D97-AF65-F5344CB8AC3E}">
-        <p14:creationId xmlns:p14="http://schemas.microsoft.com/office/powerpoint/2010/main" val="1653625500"/>
-      </p:ext>
-    </p:extLst>
-  </p:cSld>
-  <p:clrMapOvr>
-    <a:masterClrMapping/>
-  </p:clrMapOvr>
-</p:sld>
-</file>
-
-<file path=ppt/slides/slide7.xml><?xml version="1.0" encoding="utf-8"?>
-<p:sld xmlns:a="http://schemas.openxmlformats.org/drawingml/2006/main" xmlns:r="http://schemas.openxmlformats.org/officeDocument/2006/relationships" xmlns:p="http://schemas.openxmlformats.org/presentationml/2006/main">
-  <p:cSld>
-    <p:bg>
-      <p:bgPr>
-        <a:solidFill>
-          <a:schemeClr val="bg1"/>
-        </a:solidFill>
-        <a:effectLst/>
-      </p:bgPr>
-    </p:bg>
-    <p:spTree>
-      <p:nvGrpSpPr>
-        <p:cNvPr id="1" name=""/>
-        <p:cNvGrpSpPr/>
-        <p:nvPr/>
-      </p:nvGrpSpPr>
-      <p:grpSpPr>
-        <a:xfrm>
-          <a:off x="0" y="0"/>
-          <a:ext cx="0" cy="0"/>
-          <a:chOff x="0" y="0"/>
-          <a:chExt cx="0" cy="0"/>
-        </a:xfrm>
-      </p:grpSpPr>
-      <p:sp useBgFill="1">
-        <p:nvSpPr>
-          <p:cNvPr id="23" name="Rectangle 14">
-            <a:extLst>
-              <a:ext uri="{FF2B5EF4-FFF2-40B4-BE49-F238E27FC236}">
-                <a16:creationId xmlns:a16="http://schemas.microsoft.com/office/drawing/2014/main" id="{B373F125-DEF3-41D6-9918-AB21A2ACC37A}"/>
-              </a:ext>
-              <a:ext uri="{C183D7F6-B498-43B3-948B-1728B52AA6E4}">
-                <adec:decorative xmlns:adec="http://schemas.microsoft.com/office/drawing/2017/decorative" val="1"/>
-              </a:ext>
-            </a:extLst>
-          </p:cNvPr>
-          <p:cNvSpPr>
-            <a:spLocks noGrp="1" noRot="1" noChangeAspect="1" noMove="1" noResize="1" noEditPoints="1" noAdjustHandles="1" noChangeArrowheads="1" noChangeShapeType="1" noTextEdit="1"/>
-          </p:cNvSpPr>
-          <p:nvPr>
-            <p:extLst>
-              <p:ext uri="{386F3935-93C4-4BCD-93E2-E3B085C9AB24}">
-                <p16:designElem xmlns:p16="http://schemas.microsoft.com/office/powerpoint/2015/main" val="1"/>
-              </p:ext>
-            </p:extLst>
-          </p:nvPr>
+          <p:cNvSpPr txBox="1"/>
+          <p:nvPr/>
         </p:nvSpPr>
         <p:spPr>
           <a:xfrm>
-            <a:off x="0" y="0"/>
-            <a:ext cx="12192000" cy="6858000"/>
+            <a:off x="1298448" y="2633472"/>
+            <a:ext cx="10222992" cy="646331"/>
           </a:xfrm>
           <a:prstGeom prst="rect">
             <a:avLst/>
           </a:prstGeom>
+          <a:noFill/>
+        </p:spPr>
+        <p:txBody>
+          <a:bodyPr wrap="square" rtlCol="0">
+            <a:spAutoFit/>
+          </a:bodyPr>
+          <a:lstStyle/>
+          <a:p>
+            <a:r>
+              <a:rPr lang="en-US" dirty="0"/>
+              <a:t>Recommending the new items to users based on the interest and preference of other similar users is basically collaborative-based filtering.</a:t>
+            </a:r>
+            <a:endParaRPr lang="en-IN" dirty="0"/>
+          </a:p>
+        </p:txBody>
+      </p:sp>
+      <p:sp>
+        <p:nvSpPr>
+          <p:cNvPr id="5" name="Arrow: Right 4">
+            <a:extLst>
+              <a:ext uri="{FF2B5EF4-FFF2-40B4-BE49-F238E27FC236}">
+                <a16:creationId xmlns:a16="http://schemas.microsoft.com/office/drawing/2014/main" id="{AD81F0E0-B45A-4E4E-A742-9B00699BD352}"/>
+              </a:ext>
+            </a:extLst>
+          </p:cNvPr>
+          <p:cNvSpPr/>
+          <p:nvPr/>
+        </p:nvSpPr>
+        <p:spPr>
+          <a:xfrm>
+            <a:off x="896112" y="2746325"/>
+            <a:ext cx="274320" cy="210312"/>
+          </a:xfrm>
+          <a:prstGeom prst="rightArrow">
+            <a:avLst/>
+          </a:prstGeom>
+          <a:solidFill>
+            <a:schemeClr val="accent3">
+              <a:lumMod val="75000"/>
+            </a:schemeClr>
+          </a:solidFill>
           <a:ln>
             <a:noFill/>
           </a:ln>
@@ -8419,41 +9644,71 @@
           <a:lstStyle/>
           <a:p>
             <a:pPr algn="ctr"/>
-            <a:endParaRPr lang="en-US"/>
-          </a:p>
-        </p:txBody>
-      </p:sp>
-      <p:sp>
-        <p:nvSpPr>
-          <p:cNvPr id="24" name="Rectangle 16">
+            <a:endParaRPr lang="en-IN" dirty="0"/>
+          </a:p>
+        </p:txBody>
+      </p:sp>
+      <p:sp>
+        <p:nvSpPr>
+          <p:cNvPr id="6" name="TextBox 5">
             <a:extLst>
               <a:ext uri="{FF2B5EF4-FFF2-40B4-BE49-F238E27FC236}">
-                <a16:creationId xmlns:a16="http://schemas.microsoft.com/office/drawing/2014/main" id="{71E9F226-EB6E-48C9-ADDA-636DE4BF4EBE}"/>
-              </a:ext>
-              <a:ext uri="{C183D7F6-B498-43B3-948B-1728B52AA6E4}">
-                <adec:decorative xmlns:adec="http://schemas.microsoft.com/office/drawing/2017/decorative" val="1"/>
+                <a16:creationId xmlns:a16="http://schemas.microsoft.com/office/drawing/2014/main" id="{C6FDA24E-7332-4619-84C2-123C34702072}"/>
               </a:ext>
             </a:extLst>
           </p:cNvPr>
-          <p:cNvSpPr>
-            <a:spLocks noGrp="1" noRot="1" noChangeAspect="1" noMove="1" noResize="1" noEditPoints="1" noAdjustHandles="1" noChangeArrowheads="1" noChangeShapeType="1" noTextEdit="1"/>
-          </p:cNvSpPr>
-          <p:nvPr>
-            <p:extLst>
-              <p:ext uri="{386F3935-93C4-4BCD-93E2-E3B085C9AB24}">
-                <p16:designElem xmlns:p16="http://schemas.microsoft.com/office/powerpoint/2015/main" val="1"/>
-              </p:ext>
-            </p:extLst>
-          </p:nvPr>
+          <p:cNvSpPr txBox="1"/>
+          <p:nvPr/>
         </p:nvSpPr>
         <p:spPr>
           <a:xfrm>
-            <a:off x="490581" y="485678"/>
-            <a:ext cx="4174743" cy="5888772"/>
+            <a:off x="1298448" y="3298091"/>
+            <a:ext cx="10222992" cy="646331"/>
           </a:xfrm>
           <a:prstGeom prst="rect">
             <a:avLst/>
           </a:prstGeom>
+          <a:noFill/>
+        </p:spPr>
+        <p:txBody>
+          <a:bodyPr wrap="square" rtlCol="0">
+            <a:spAutoFit/>
+          </a:bodyPr>
+          <a:lstStyle/>
+          <a:p>
+            <a:r>
+              <a:rPr lang="en-US" dirty="0"/>
+              <a:t> it only needs the historical performance of the users. Based on the historical data, with the assumption that user who has agreed in past tends to also agree in future.</a:t>
+            </a:r>
+            <a:endParaRPr lang="en-IN" dirty="0"/>
+          </a:p>
+        </p:txBody>
+      </p:sp>
+      <p:sp>
+        <p:nvSpPr>
+          <p:cNvPr id="7" name="Arrow: Right 6">
+            <a:extLst>
+              <a:ext uri="{FF2B5EF4-FFF2-40B4-BE49-F238E27FC236}">
+                <a16:creationId xmlns:a16="http://schemas.microsoft.com/office/drawing/2014/main" id="{96C6A060-DDAA-44E4-AC74-A56C39E2770C}"/>
+              </a:ext>
+            </a:extLst>
+          </p:cNvPr>
+          <p:cNvSpPr/>
+          <p:nvPr/>
+        </p:nvSpPr>
+        <p:spPr>
+          <a:xfrm>
+            <a:off x="896112" y="3410944"/>
+            <a:ext cx="274320" cy="210312"/>
+          </a:xfrm>
+          <a:prstGeom prst="rightArrow">
+            <a:avLst/>
+          </a:prstGeom>
+          <a:solidFill>
+            <a:schemeClr val="accent3">
+              <a:lumMod val="75000"/>
+            </a:schemeClr>
+          </a:solidFill>
           <a:ln>
             <a:noFill/>
           </a:ln>
@@ -8479,16 +9734,46 @@
           <a:lstStyle/>
           <a:p>
             <a:pPr algn="ctr"/>
-            <a:endParaRPr lang="en-US"/>
-          </a:p>
-        </p:txBody>
-      </p:sp>
+            <a:endParaRPr lang="en-IN" dirty="0"/>
+          </a:p>
+        </p:txBody>
+      </p:sp>
+    </p:spTree>
+    <p:extLst>
+      <p:ext uri="{BB962C8B-B14F-4D97-AF65-F5344CB8AC3E}">
+        <p14:creationId xmlns:p14="http://schemas.microsoft.com/office/powerpoint/2010/main" val="3091145718"/>
+      </p:ext>
+    </p:extLst>
+  </p:cSld>
+  <p:clrMapOvr>
+    <a:masterClrMapping/>
+  </p:clrMapOvr>
+</p:sld>
+</file>
+
+<file path=ppt/slides/slide7.xml><?xml version="1.0" encoding="utf-8"?>
+<p:sld xmlns:a="http://schemas.openxmlformats.org/drawingml/2006/main" xmlns:r="http://schemas.openxmlformats.org/officeDocument/2006/relationships" xmlns:p="http://schemas.openxmlformats.org/presentationml/2006/main">
+  <p:cSld>
+    <p:spTree>
+      <p:nvGrpSpPr>
+        <p:cNvPr id="1" name=""/>
+        <p:cNvGrpSpPr/>
+        <p:nvPr/>
+      </p:nvGrpSpPr>
+      <p:grpSpPr>
+        <a:xfrm>
+          <a:off x="0" y="0"/>
+          <a:ext cx="0" cy="0"/>
+          <a:chOff x="0" y="0"/>
+          <a:chExt cx="0" cy="0"/>
+        </a:xfrm>
+      </p:grpSpPr>
       <p:sp>
         <p:nvSpPr>
           <p:cNvPr id="2" name="Title 1">
             <a:extLst>
               <a:ext uri="{FF2B5EF4-FFF2-40B4-BE49-F238E27FC236}">
-                <a16:creationId xmlns:a16="http://schemas.microsoft.com/office/drawing/2014/main" id="{ACC8C168-C2AD-4557-B94F-FF161D69725E}"/>
+                <a16:creationId xmlns:a16="http://schemas.microsoft.com/office/drawing/2014/main" id="{F58E4921-2BAD-4C70-BBDF-1477353D9E9D}"/>
               </a:ext>
             </a:extLst>
           </p:cNvPr>
@@ -8501,133 +9786,206 @@
         </p:nvSpPr>
         <p:spPr>
           <a:xfrm>
-            <a:off x="959157" y="1113764"/>
-            <a:ext cx="3269749" cy="4624327"/>
+            <a:off x="690920" y="950976"/>
+            <a:ext cx="11029616" cy="646108"/>
           </a:xfrm>
         </p:spPr>
         <p:txBody>
-          <a:bodyPr anchor="ctr">
-            <a:normAutofit/>
-          </a:bodyPr>
+          <a:bodyPr/>
           <a:lstStyle/>
           <a:p>
-            <a:r>
-              <a:rPr lang="en-US" sz="3200">
-                <a:solidFill>
-                  <a:srgbClr val="FFFFFF"/>
-                </a:solidFill>
-              </a:rPr>
-              <a:t>Overcome the cold start problem</a:t>
-            </a:r>
-          </a:p>
-        </p:txBody>
-      </p:sp>
-      <p:sp>
-        <p:nvSpPr>
-          <p:cNvPr id="3" name="Content Placeholder 2">
+            <a:pPr algn="ctr"/>
+            <a:r>
+              <a:rPr lang="en-IN" dirty="0"/>
+              <a:t>Content based recommendation system</a:t>
+            </a:r>
+          </a:p>
+        </p:txBody>
+      </p:sp>
+      <p:sp>
+        <p:nvSpPr>
+          <p:cNvPr id="4" name="TextBox 3">
             <a:extLst>
               <a:ext uri="{FF2B5EF4-FFF2-40B4-BE49-F238E27FC236}">
-                <a16:creationId xmlns:a16="http://schemas.microsoft.com/office/drawing/2014/main" id="{03B22758-B9F3-4178-AF0F-07017727B833}"/>
+                <a16:creationId xmlns:a16="http://schemas.microsoft.com/office/drawing/2014/main" id="{527D2A5B-04B3-478B-A445-D8824E83657D}"/>
               </a:ext>
             </a:extLst>
           </p:cNvPr>
-          <p:cNvSpPr>
-            <a:spLocks noGrp="1"/>
-          </p:cNvSpPr>
-          <p:nvPr>
-            <p:ph idx="1"/>
-          </p:nvPr>
+          <p:cNvSpPr txBox="1"/>
+          <p:nvPr/>
         </p:nvSpPr>
         <p:spPr>
           <a:xfrm>
-            <a:off x="5155905" y="1113764"/>
-            <a:ext cx="6108179" cy="4624327"/>
+            <a:off x="1170432" y="2633472"/>
+            <a:ext cx="10057112" cy="369332"/>
           </a:xfrm>
+          <a:prstGeom prst="rect">
+            <a:avLst/>
+          </a:prstGeom>
+          <a:noFill/>
         </p:spPr>
         <p:txBody>
-          <a:bodyPr anchor="ctr">
-            <a:normAutofit/>
+          <a:bodyPr wrap="none" rtlCol="0">
+            <a:spAutoFit/>
           </a:bodyPr>
           <a:lstStyle/>
           <a:p>
-            <a:pPr marL="0" indent="0">
-              <a:buNone/>
-            </a:pPr>
-            <a:r>
-              <a:rPr lang="en-US" b="1" i="0" dirty="0">
-                <a:effectLst/>
-              </a:rPr>
-              <a:t>NEW USER COLD START SOLUTIONS</a:t>
-            </a:r>
-          </a:p>
-          <a:p>
-            <a:r>
-              <a:rPr lang="en-US" b="0" i="0" dirty="0">
-                <a:effectLst/>
-              </a:rPr>
-              <a:t>Use implicit data</a:t>
-            </a:r>
-          </a:p>
-          <a:p>
-            <a:r>
-              <a:rPr lang="en-US" b="0" i="0" dirty="0">
-                <a:effectLst/>
-              </a:rPr>
-              <a:t>Recommend top sellers / do promotions</a:t>
-            </a:r>
-            <a:endParaRPr lang="en-US" dirty="0"/>
-          </a:p>
-          <a:p>
-            <a:r>
-              <a:rPr lang="en-US" b="0" i="0" dirty="0">
-                <a:effectLst/>
-              </a:rPr>
-              <a:t> Interview the user</a:t>
-            </a:r>
-          </a:p>
-          <a:p>
-            <a:pPr marL="0" indent="0">
-              <a:buNone/>
-            </a:pPr>
-            <a:r>
-              <a:rPr lang="en-US" b="1" i="0" dirty="0">
-                <a:effectLst/>
-              </a:rPr>
-              <a:t>NEW ITEM COLD START SOLUTIONS</a:t>
-            </a:r>
-          </a:p>
-          <a:p>
-            <a:r>
-              <a:rPr lang="en-US" b="0" i="0" dirty="0">
-                <a:effectLst/>
-              </a:rPr>
-              <a:t>Content-based Recommendations</a:t>
-            </a:r>
-          </a:p>
-          <a:p>
-            <a:r>
-              <a:rPr lang="en-US" b="0" i="0" dirty="0">
-                <a:effectLst/>
-              </a:rPr>
-              <a:t>Random Exploration</a:t>
-            </a:r>
-            <a:endParaRPr lang="en-US" dirty="0"/>
-          </a:p>
-          <a:p>
-            <a:r>
-              <a:rPr lang="en-US" b="0" i="0" dirty="0">
-                <a:effectLst/>
-              </a:rPr>
-              <a:t>Map content attributes to hidden features found by matrix factorization</a:t>
-            </a:r>
-            <a:endParaRPr lang="en-US" dirty="0"/>
+            <a:r>
+              <a:rPr lang="en-US" dirty="0"/>
+              <a:t>In this type, the relevant items are shown using the content of the previously searched items by the users.</a:t>
+            </a:r>
+            <a:endParaRPr lang="en-IN" dirty="0"/>
+          </a:p>
+        </p:txBody>
+      </p:sp>
+      <p:sp>
+        <p:nvSpPr>
+          <p:cNvPr id="3" name="Arrow: Right 2">
+            <a:extLst>
+              <a:ext uri="{FF2B5EF4-FFF2-40B4-BE49-F238E27FC236}">
+                <a16:creationId xmlns:a16="http://schemas.microsoft.com/office/drawing/2014/main" id="{8F18E25D-0227-4CE1-B0B5-1F12F53F496F}"/>
+              </a:ext>
+            </a:extLst>
+          </p:cNvPr>
+          <p:cNvSpPr/>
+          <p:nvPr/>
+        </p:nvSpPr>
+        <p:spPr>
+          <a:xfrm>
+            <a:off x="896112" y="2712982"/>
+            <a:ext cx="274320" cy="210312"/>
+          </a:xfrm>
+          <a:prstGeom prst="rightArrow">
+            <a:avLst/>
+          </a:prstGeom>
+          <a:solidFill>
+            <a:schemeClr val="accent3">
+              <a:lumMod val="75000"/>
+            </a:schemeClr>
+          </a:solidFill>
+          <a:ln>
+            <a:noFill/>
+          </a:ln>
+        </p:spPr>
+        <p:style>
+          <a:lnRef idx="2">
+            <a:schemeClr val="accent1">
+              <a:shade val="50000"/>
+            </a:schemeClr>
+          </a:lnRef>
+          <a:fillRef idx="1">
+            <a:schemeClr val="accent1"/>
+          </a:fillRef>
+          <a:effectRef idx="0">
+            <a:schemeClr val="accent1"/>
+          </a:effectRef>
+          <a:fontRef idx="minor">
+            <a:schemeClr val="lt1"/>
+          </a:fontRef>
+        </p:style>
+        <p:txBody>
+          <a:bodyPr rtlCol="0" anchor="ctr"/>
+          <a:lstStyle/>
+          <a:p>
+            <a:pPr algn="ctr"/>
+            <a:endParaRPr lang="en-IN" dirty="0"/>
+          </a:p>
+        </p:txBody>
+      </p:sp>
+      <p:sp>
+        <p:nvSpPr>
+          <p:cNvPr id="5" name="TextBox 4">
+            <a:extLst>
+              <a:ext uri="{FF2B5EF4-FFF2-40B4-BE49-F238E27FC236}">
+                <a16:creationId xmlns:a16="http://schemas.microsoft.com/office/drawing/2014/main" id="{CED6A989-F078-4561-8BB8-66E0A516D343}"/>
+              </a:ext>
+            </a:extLst>
+          </p:cNvPr>
+          <p:cNvSpPr txBox="1"/>
+          <p:nvPr/>
+        </p:nvSpPr>
+        <p:spPr>
+          <a:xfrm>
+            <a:off x="1170432" y="3139178"/>
+            <a:ext cx="10057112" cy="646331"/>
+          </a:xfrm>
+          <a:prstGeom prst="rect">
+            <a:avLst/>
+          </a:prstGeom>
+          <a:noFill/>
+        </p:spPr>
+        <p:txBody>
+          <a:bodyPr wrap="square" rtlCol="0">
+            <a:spAutoFit/>
+          </a:bodyPr>
+          <a:lstStyle/>
+          <a:p>
+            <a:r>
+              <a:rPr lang="en-US" dirty="0"/>
+              <a:t>The products are tagged using certain keywords, then the system tries to understand what the user wants and it looks in its database and finally tries to recommend different products that the user wants.</a:t>
+            </a:r>
+            <a:endParaRPr lang="en-IN" dirty="0"/>
+          </a:p>
+        </p:txBody>
+      </p:sp>
+      <p:sp>
+        <p:nvSpPr>
+          <p:cNvPr id="6" name="Arrow: Right 5">
+            <a:extLst>
+              <a:ext uri="{FF2B5EF4-FFF2-40B4-BE49-F238E27FC236}">
+                <a16:creationId xmlns:a16="http://schemas.microsoft.com/office/drawing/2014/main" id="{510282C0-A7F8-4CCB-BB87-9D9FD957298F}"/>
+              </a:ext>
+            </a:extLst>
+          </p:cNvPr>
+          <p:cNvSpPr/>
+          <p:nvPr/>
+        </p:nvSpPr>
+        <p:spPr>
+          <a:xfrm>
+            <a:off x="891304" y="3357187"/>
+            <a:ext cx="274320" cy="210312"/>
+          </a:xfrm>
+          <a:prstGeom prst="rightArrow">
+            <a:avLst/>
+          </a:prstGeom>
+          <a:solidFill>
+            <a:schemeClr val="accent3">
+              <a:lumMod val="75000"/>
+            </a:schemeClr>
+          </a:solidFill>
+          <a:ln>
+            <a:noFill/>
+          </a:ln>
+        </p:spPr>
+        <p:style>
+          <a:lnRef idx="2">
+            <a:schemeClr val="accent1">
+              <a:shade val="50000"/>
+            </a:schemeClr>
+          </a:lnRef>
+          <a:fillRef idx="1">
+            <a:schemeClr val="accent1"/>
+          </a:fillRef>
+          <a:effectRef idx="0">
+            <a:schemeClr val="accent1"/>
+          </a:effectRef>
+          <a:fontRef idx="minor">
+            <a:schemeClr val="lt1"/>
+          </a:fontRef>
+        </p:style>
+        <p:txBody>
+          <a:bodyPr rtlCol="0" anchor="ctr"/>
+          <a:lstStyle/>
+          <a:p>
+            <a:pPr algn="ctr"/>
+            <a:endParaRPr lang="en-IN" dirty="0"/>
           </a:p>
         </p:txBody>
       </p:sp>
     </p:spTree>
     <p:extLst>
       <p:ext uri="{BB962C8B-B14F-4D97-AF65-F5344CB8AC3E}">
-        <p14:creationId xmlns:p14="http://schemas.microsoft.com/office/powerpoint/2010/main" val="1515619071"/>
+        <p14:creationId xmlns:p14="http://schemas.microsoft.com/office/powerpoint/2010/main" val="3251742453"/>
       </p:ext>
     </p:extLst>
   </p:cSld>
@@ -8659,7 +10017,7 @@
           <p:cNvPr id="2" name="Title 1">
             <a:extLst>
               <a:ext uri="{FF2B5EF4-FFF2-40B4-BE49-F238E27FC236}">
-                <a16:creationId xmlns:a16="http://schemas.microsoft.com/office/drawing/2014/main" id="{63E061F6-B5EA-4F50-8CBF-A15FDC85F066}"/>
+                <a16:creationId xmlns:a16="http://schemas.microsoft.com/office/drawing/2014/main" id="{BBD28E1B-B302-416F-B72A-488EF37D3916}"/>
               </a:ext>
             </a:extLst>
           </p:cNvPr>
@@ -8676,9 +10034,27 @@
           <a:lstStyle/>
           <a:p>
             <a:r>
-              <a:rPr lang="en-US" dirty="0"/>
-              <a:t>Advantage and disadvantage of recommendation system</a:t>
-            </a:r>
+              <a:rPr lang="en-US" b="1" i="0" dirty="0">
+                <a:effectLst/>
+              </a:rPr>
+              <a:t> </a:t>
+            </a:r>
+            <a:r>
+              <a:rPr lang="en-US" i="0" dirty="0">
+                <a:effectLst/>
+              </a:rPr>
+              <a:t>COLD START PROBLEM</a:t>
+            </a:r>
+            <a:br>
+              <a:rPr lang="en-US" b="0" i="0" dirty="0">
+                <a:solidFill>
+                  <a:srgbClr val="292929"/>
+                </a:solidFill>
+                <a:effectLst/>
+                <a:latin typeface="sohne"/>
+              </a:rPr>
+            </a:br>
+            <a:endParaRPr lang="en-US" dirty="0"/>
           </a:p>
         </p:txBody>
       </p:sp>
@@ -8687,7 +10063,7 @@
           <p:cNvPr id="3" name="Content Placeholder 2">
             <a:extLst>
               <a:ext uri="{FF2B5EF4-FFF2-40B4-BE49-F238E27FC236}">
-                <a16:creationId xmlns:a16="http://schemas.microsoft.com/office/drawing/2014/main" id="{FE9CEA21-1B95-49A9-BE76-EB4ECE53C140}"/>
+                <a16:creationId xmlns:a16="http://schemas.microsoft.com/office/drawing/2014/main" id="{3529DE2B-79BE-4135-A411-BB760D2406FB}"/>
               </a:ext>
             </a:extLst>
           </p:cNvPr>
@@ -8695,267 +10071,58 @@
             <a:spLocks noGrp="1"/>
           </p:cNvSpPr>
           <p:nvPr>
-            <p:ph sz="half" idx="1"/>
+            <p:ph idx="1"/>
           </p:nvPr>
         </p:nvSpPr>
-        <p:spPr>
-          <a:xfrm>
-            <a:off x="581194" y="3088462"/>
-            <a:ext cx="5422390" cy="3633047"/>
-          </a:xfrm>
-        </p:spPr>
-        <p:txBody>
-          <a:bodyPr>
-            <a:normAutofit fontScale="92500" lnSpcReduction="20000"/>
-          </a:bodyPr>
+        <p:spPr/>
+        <p:txBody>
+          <a:bodyPr/>
           <a:lstStyle/>
           <a:p>
-            <a:pPr marL="0" indent="0" algn="l">
-              <a:buNone/>
-            </a:pPr>
-            <a:r>
-              <a:rPr lang="en-US" sz="2400" b="1" dirty="0"/>
-              <a:t>Advantage for </a:t>
-            </a:r>
-            <a:r>
-              <a:rPr lang="en-US" sz="2400" b="1" i="0" dirty="0">
+            <a:r>
+              <a:rPr lang="en-US" sz="2000" b="0" i="0" dirty="0">
+                <a:solidFill>
+                  <a:srgbClr val="292929"/>
+                </a:solidFill>
+                <a:effectLst/>
+                <a:cs typeface="Arial" panose="020B0604020202020204" pitchFamily="34" charset="0"/>
+              </a:rPr>
+              <a:t>Cold start problem arises </a:t>
+            </a:r>
+            <a:r>
+              <a:rPr lang="en-US" sz="2000" b="0" i="0" dirty="0">
                 <a:solidFill>
                   <a:srgbClr val="000000"/>
                 </a:solidFill>
                 <a:effectLst/>
+                <a:cs typeface="Arial" panose="020B0604020202020204" pitchFamily="34" charset="0"/>
               </a:rPr>
-              <a:t>Collaborative </a:t>
-            </a:r>
-          </a:p>
-          <a:p>
-            <a:pPr marL="0" indent="0" algn="l">
-              <a:buNone/>
-            </a:pPr>
-            <a:r>
-              <a:rPr lang="en-US" sz="2400" b="1" i="0" dirty="0">
+              <a:t>at the time of registration of new user or adding up new resource or item in the system.</a:t>
+            </a:r>
+          </a:p>
+          <a:p>
+            <a:r>
+              <a:rPr lang="en-US" sz="2000" dirty="0">
+                <a:solidFill>
+                  <a:srgbClr val="000000"/>
+                </a:solidFill>
+                <a:cs typeface="Arial" panose="020B0604020202020204" pitchFamily="34" charset="0"/>
+              </a:rPr>
+              <a:t>T</a:t>
+            </a:r>
+            <a:r>
+              <a:rPr lang="en-US" sz="2000" b="0" i="0" dirty="0">
                 <a:solidFill>
                   <a:srgbClr val="000000"/>
                 </a:solidFill>
                 <a:effectLst/>
+                <a:cs typeface="Arial" panose="020B0604020202020204" pitchFamily="34" charset="0"/>
               </a:rPr>
-              <a:t>recommendation </a:t>
-            </a:r>
-          </a:p>
-          <a:p>
-            <a:r>
-              <a:rPr lang="en-US" i="0" dirty="0">
-                <a:solidFill>
-                  <a:srgbClr val="202124"/>
-                </a:solidFill>
-                <a:effectLst/>
-              </a:rPr>
-              <a:t>No domain knowledge necessary</a:t>
-            </a:r>
-          </a:p>
-          <a:p>
-            <a:pPr algn="l"/>
-            <a:r>
-              <a:rPr lang="en-US" b="0" i="0" dirty="0">
-                <a:solidFill>
-                  <a:srgbClr val="000000"/>
-                </a:solidFill>
-                <a:effectLst/>
-              </a:rPr>
-              <a:t>The system matches similar items between users. </a:t>
-            </a:r>
-          </a:p>
-          <a:p>
-            <a:pPr algn="l"/>
-            <a:r>
-              <a:rPr lang="en-US" i="0" dirty="0">
-                <a:solidFill>
-                  <a:srgbClr val="202124"/>
-                </a:solidFill>
-                <a:effectLst/>
-              </a:rPr>
-              <a:t>Great starting point</a:t>
-            </a:r>
-          </a:p>
-          <a:p>
-            <a:pPr marL="0" indent="0" algn="l">
-              <a:buNone/>
-            </a:pPr>
-            <a:r>
-              <a:rPr lang="en-US" sz="2400" b="1" dirty="0"/>
-              <a:t>Advantage for Content Based</a:t>
-            </a:r>
-          </a:p>
-          <a:p>
-            <a:pPr algn="l"/>
-            <a:r>
-              <a:rPr lang="en-US" b="0" i="0" dirty="0">
-                <a:solidFill>
-                  <a:srgbClr val="000000"/>
-                </a:solidFill>
-                <a:effectLst/>
-              </a:rPr>
-              <a:t>The system didn’t use the user's data to recommend items. </a:t>
-            </a:r>
-          </a:p>
-          <a:p>
-            <a:pPr algn="l"/>
-            <a:r>
-              <a:rPr lang="en-US" b="0" i="0" dirty="0">
-                <a:solidFill>
-                  <a:srgbClr val="000000"/>
-                </a:solidFill>
-                <a:effectLst/>
-              </a:rPr>
-              <a:t>The system has the ability to recommend new items to the users based on similarity between items specifications.. </a:t>
-            </a:r>
-          </a:p>
-          <a:p>
-            <a:pPr algn="l"/>
-            <a:endParaRPr lang="en-US" b="0" i="0" dirty="0">
-              <a:solidFill>
-                <a:srgbClr val="000000"/>
-              </a:solidFill>
-              <a:effectLst/>
-              <a:latin typeface="ff1"/>
-            </a:endParaRPr>
-          </a:p>
-          <a:p>
-            <a:endParaRPr lang="en-US" i="0" dirty="0">
-              <a:solidFill>
-                <a:srgbClr val="000000"/>
-              </a:solidFill>
-              <a:effectLst/>
-            </a:endParaRPr>
+              <a:t>here would be no information about user’s interest or his rating for any particular item in the system, and recommending appropriate item at that time to the new user is very challenging.</a:t>
+            </a:r>
           </a:p>
           <a:p>
             <a:endParaRPr lang="en-US" dirty="0"/>
-          </a:p>
-          <a:p>
-            <a:endParaRPr lang="en-US" sz="2400" dirty="0"/>
-          </a:p>
-          <a:p>
-            <a:pPr marL="0" indent="0">
-              <a:buNone/>
-            </a:pPr>
-            <a:endParaRPr lang="en-US" dirty="0"/>
-          </a:p>
-        </p:txBody>
-      </p:sp>
-      <p:sp>
-        <p:nvSpPr>
-          <p:cNvPr id="4" name="Content Placeholder 3">
-            <a:extLst>
-              <a:ext uri="{FF2B5EF4-FFF2-40B4-BE49-F238E27FC236}">
-                <a16:creationId xmlns:a16="http://schemas.microsoft.com/office/drawing/2014/main" id="{AFA84FA7-9FEF-4B66-BBB6-815F34EEDCF1}"/>
-              </a:ext>
-            </a:extLst>
-          </p:cNvPr>
-          <p:cNvSpPr>
-            <a:spLocks noGrp="1"/>
-          </p:cNvSpPr>
-          <p:nvPr>
-            <p:ph sz="half" idx="2"/>
-          </p:nvPr>
-        </p:nvSpPr>
-        <p:spPr/>
-        <p:txBody>
-          <a:bodyPr>
-            <a:normAutofit fontScale="92500" lnSpcReduction="20000"/>
-          </a:bodyPr>
-          <a:lstStyle/>
-          <a:p>
-            <a:pPr marL="0" indent="0" algn="l">
-              <a:buNone/>
-            </a:pPr>
-            <a:r>
-              <a:rPr lang="en-US" sz="2400" b="1" dirty="0"/>
-              <a:t>Disadvantage for </a:t>
-            </a:r>
-            <a:r>
-              <a:rPr lang="en-US" sz="2400" b="1" i="0" dirty="0">
-                <a:solidFill>
-                  <a:srgbClr val="000000"/>
-                </a:solidFill>
-                <a:effectLst/>
-              </a:rPr>
-              <a:t>Collaborative </a:t>
-            </a:r>
-          </a:p>
-          <a:p>
-            <a:pPr marL="0" indent="0" algn="l">
-              <a:buNone/>
-            </a:pPr>
-            <a:r>
-              <a:rPr lang="en-US" sz="2400" b="1" i="0" dirty="0">
-                <a:solidFill>
-                  <a:srgbClr val="000000"/>
-                </a:solidFill>
-                <a:effectLst/>
-              </a:rPr>
-              <a:t>recommendation </a:t>
-            </a:r>
-          </a:p>
-          <a:p>
-            <a:r>
-              <a:rPr lang="en-US" i="0" dirty="0">
-                <a:solidFill>
-                  <a:srgbClr val="202124"/>
-                </a:solidFill>
-                <a:effectLst/>
-              </a:rPr>
-              <a:t>Cannot handle fresh items</a:t>
-            </a:r>
-          </a:p>
-          <a:p>
-            <a:pPr algn="l"/>
-            <a:r>
-              <a:rPr lang="en-US" b="0" i="0" dirty="0">
-                <a:solidFill>
-                  <a:srgbClr val="000000"/>
-                </a:solidFill>
-                <a:effectLst/>
-              </a:rPr>
-              <a:t>The quality of the system depends on the highest rating item list. </a:t>
-            </a:r>
-          </a:p>
-          <a:p>
-            <a:pPr marL="0" indent="0">
-              <a:buNone/>
-            </a:pPr>
-            <a:r>
-              <a:rPr lang="en-US" sz="2400" b="1" dirty="0"/>
-              <a:t>Disadvantage for Content Based</a:t>
-            </a:r>
-          </a:p>
-          <a:p>
-            <a:pPr algn="l"/>
-            <a:r>
-              <a:rPr lang="en-US" b="0" i="0" dirty="0">
-                <a:solidFill>
-                  <a:srgbClr val="000000"/>
-                </a:solidFill>
-                <a:effectLst/>
-              </a:rPr>
-              <a:t>We need for analysis and detect all item features to create a recommendation list </a:t>
-            </a:r>
-          </a:p>
-          <a:p>
-            <a:pPr marL="0" indent="0" algn="l">
-              <a:buNone/>
-            </a:pPr>
-            <a:endParaRPr lang="en-US" b="0" i="0" dirty="0">
-              <a:solidFill>
-                <a:srgbClr val="000000"/>
-              </a:solidFill>
-              <a:effectLst/>
-              <a:latin typeface="ff1"/>
-            </a:endParaRPr>
-          </a:p>
-          <a:p>
-            <a:pPr marL="0" indent="0">
-              <a:buNone/>
-            </a:pPr>
-            <a:endParaRPr lang="en-US" sz="1800" dirty="0"/>
           </a:p>
           <a:p>
             <a:endParaRPr lang="en-US" dirty="0"/>
@@ -8965,7 +10132,7 @@
     </p:spTree>
     <p:extLst>
       <p:ext uri="{BB962C8B-B14F-4D97-AF65-F5344CB8AC3E}">
-        <p14:creationId xmlns:p14="http://schemas.microsoft.com/office/powerpoint/2010/main" val="3580546117"/>
+        <p14:creationId xmlns:p14="http://schemas.microsoft.com/office/powerpoint/2010/main" val="150825481"/>
       </p:ext>
     </p:extLst>
   </p:cSld>
@@ -8978,14 +10145,6 @@
 <file path=ppt/slides/slide9.xml><?xml version="1.0" encoding="utf-8"?>
 <p:sld xmlns:a="http://schemas.openxmlformats.org/drawingml/2006/main" xmlns:r="http://schemas.openxmlformats.org/officeDocument/2006/relationships" xmlns:p="http://schemas.openxmlformats.org/presentationml/2006/main">
   <p:cSld>
-    <p:bg>
-      <p:bgPr>
-        <a:solidFill>
-          <a:schemeClr val="bg1"/>
-        </a:solidFill>
-        <a:effectLst/>
-      </p:bgPr>
-    </p:bg>
     <p:spTree>
       <p:nvGrpSpPr>
         <p:cNvPr id="1" name=""/>
@@ -9005,7 +10164,7 @@
           <p:cNvPr id="2" name="Title 1">
             <a:extLst>
               <a:ext uri="{FF2B5EF4-FFF2-40B4-BE49-F238E27FC236}">
-                <a16:creationId xmlns:a16="http://schemas.microsoft.com/office/drawing/2014/main" id="{7A4919D0-F177-4BBA-9A0B-DBA69E2ED764}"/>
+                <a16:creationId xmlns:a16="http://schemas.microsoft.com/office/drawing/2014/main" id="{833FE25B-50B9-4C64-8685-D9D5CD928579}"/>
               </a:ext>
             </a:extLst>
           </p:cNvPr>
@@ -9018,54 +10177,99 @@
         </p:nvSpPr>
         <p:spPr/>
         <p:txBody>
-          <a:bodyPr>
-            <a:normAutofit/>
-          </a:bodyPr>
+          <a:bodyPr/>
           <a:lstStyle/>
           <a:p>
-            <a:pPr algn="ctr"/>
             <a:r>
               <a:rPr lang="en-US" dirty="0"/>
-              <a:t>Title Lorem Ipsum </a:t>
-            </a:r>
-          </a:p>
-        </p:txBody>
-      </p:sp>
-      <p:graphicFrame>
-        <p:nvGraphicFramePr>
-          <p:cNvPr id="5" name="Content Placeholder 2" descr="SmartArt graphic">
+              <a:t>Types of cold start problem</a:t>
+            </a:r>
+          </a:p>
+        </p:txBody>
+      </p:sp>
+      <p:sp>
+        <p:nvSpPr>
+          <p:cNvPr id="3" name="Content Placeholder 2">
             <a:extLst>
               <a:ext uri="{FF2B5EF4-FFF2-40B4-BE49-F238E27FC236}">
-                <a16:creationId xmlns:a16="http://schemas.microsoft.com/office/drawing/2014/main" id="{91DB1382-7276-49FA-9632-38D558F457E3}"/>
+                <a16:creationId xmlns:a16="http://schemas.microsoft.com/office/drawing/2014/main" id="{A409F203-CDB1-48CD-B3DF-887636D0F60E}"/>
               </a:ext>
             </a:extLst>
           </p:cNvPr>
-          <p:cNvGraphicFramePr>
-            <a:graphicFrameLocks noGrp="1"/>
-          </p:cNvGraphicFramePr>
+          <p:cNvSpPr>
+            <a:spLocks noGrp="1"/>
+          </p:cNvSpPr>
           <p:nvPr>
             <p:ph idx="1"/>
-            <p:extLst>
-              <p:ext uri="{D42A27DB-BD31-4B8C-83A1-F6EECF244321}">
-                <p14:modId xmlns:p14="http://schemas.microsoft.com/office/powerpoint/2010/main" val="3617019551"/>
-              </p:ext>
-            </p:extLst>
           </p:nvPr>
-        </p:nvGraphicFramePr>
-        <p:xfrm>
-          <a:off x="1066800" y="2310063"/>
-          <a:ext cx="10058400" cy="3725612"/>
-        </p:xfrm>
-        <a:graphic>
-          <a:graphicData uri="http://schemas.openxmlformats.org/drawingml/2006/diagram">
-            <dgm:relIds xmlns:dgm="http://schemas.openxmlformats.org/drawingml/2006/diagram" xmlns:r="http://schemas.openxmlformats.org/officeDocument/2006/relationships" r:dm="rId2" r:lo="rId3" r:qs="rId4" r:cs="rId5"/>
-          </a:graphicData>
-        </a:graphic>
-      </p:graphicFrame>
+        </p:nvSpPr>
+        <p:spPr/>
+        <p:txBody>
+          <a:bodyPr/>
+          <a:lstStyle/>
+          <a:p>
+            <a:r>
+              <a:rPr lang="en-US" sz="2400" i="0" dirty="0">
+                <a:solidFill>
+                  <a:srgbClr val="292929"/>
+                </a:solidFill>
+                <a:effectLst/>
+                <a:cs typeface="Arial" panose="020B0604020202020204" pitchFamily="34" charset="0"/>
+              </a:rPr>
+              <a:t>New user </a:t>
+            </a:r>
+            <a:r>
+              <a:rPr lang="en-US" sz="2400" b="0" i="0" dirty="0">
+                <a:solidFill>
+                  <a:srgbClr val="292929"/>
+                </a:solidFill>
+                <a:effectLst/>
+                <a:cs typeface="Arial" panose="020B0604020202020204" pitchFamily="34" charset="0"/>
+              </a:rPr>
+              <a:t>(what to recommend?)</a:t>
+            </a:r>
+          </a:p>
+          <a:p>
+            <a:r>
+              <a:rPr lang="en-US" sz="2400" i="0" dirty="0">
+                <a:solidFill>
+                  <a:srgbClr val="292929"/>
+                </a:solidFill>
+                <a:effectLst/>
+                <a:cs typeface="Arial" panose="020B0604020202020204" pitchFamily="34" charset="0"/>
+              </a:rPr>
+              <a:t>New items </a:t>
+            </a:r>
+            <a:r>
+              <a:rPr lang="en-US" sz="2400" b="0" i="0" dirty="0">
+                <a:solidFill>
+                  <a:srgbClr val="292929"/>
+                </a:solidFill>
+                <a:effectLst/>
+                <a:cs typeface="Arial" panose="020B0604020202020204" pitchFamily="34" charset="0"/>
+              </a:rPr>
+              <a:t>(Whom to recommend?)</a:t>
+            </a:r>
+          </a:p>
+          <a:p>
+            <a:endParaRPr lang="en-US" sz="2400" b="0" i="0" dirty="0">
+              <a:solidFill>
+                <a:srgbClr val="292929"/>
+              </a:solidFill>
+              <a:effectLst/>
+              <a:latin typeface="Arial" panose="020B0604020202020204" pitchFamily="34" charset="0"/>
+              <a:cs typeface="Arial" panose="020B0604020202020204" pitchFamily="34" charset="0"/>
+            </a:endParaRPr>
+          </a:p>
+          <a:p>
+            <a:endParaRPr lang="en-US" dirty="0"/>
+          </a:p>
+        </p:txBody>
+      </p:sp>
     </p:spTree>
     <p:extLst>
       <p:ext uri="{BB962C8B-B14F-4D97-AF65-F5344CB8AC3E}">
-        <p14:creationId xmlns:p14="http://schemas.microsoft.com/office/powerpoint/2010/main" val="183243182"/>
+        <p14:creationId xmlns:p14="http://schemas.microsoft.com/office/powerpoint/2010/main" val="1653625500"/>
       </p:ext>
     </p:extLst>
   </p:cSld>
@@ -9345,24 +10549,6 @@
 </file>
 
 <file path=customXml/item1.xml><?xml version="1.0" encoding="utf-8"?>
-<p:properties xmlns:p="http://schemas.microsoft.com/office/2006/metadata/properties" xmlns:xsi="http://www.w3.org/2001/XMLSchema-instance" xmlns:pc="http://schemas.microsoft.com/office/infopath/2007/PartnerControls">
-  <documentManagement>
-    <Status xmlns="71af3243-3dd4-4a8d-8c0d-dd76da1f02a5">Not started</Status>
-    <MediaServiceKeyPoints xmlns="71af3243-3dd4-4a8d-8c0d-dd76da1f02a5" xsi:nil="true"/>
-  </documentManagement>
-</p:properties>
-</file>
-
-<file path=customXml/item2.xml><?xml version="1.0" encoding="utf-8"?>
-<?mso-contentType ?>
-<FormTemplates xmlns="http://schemas.microsoft.com/sharepoint/v3/contenttype/forms">
-  <Display>DocumentLibraryForm</Display>
-  <Edit>DocumentLibraryForm</Edit>
-  <New>DocumentLibraryForm</New>
-</FormTemplates>
-</file>
-
-<file path=customXml/item3.xml><?xml version="1.0" encoding="utf-8"?>
 <ct:contentTypeSchema xmlns:ct="http://schemas.microsoft.com/office/2006/metadata/contentType" xmlns:ma="http://schemas.microsoft.com/office/2006/metadata/properties/metaAttributes" ct:_="" ma:_="" ma:contentTypeName="Document" ma:contentTypeID="0x01010079F111ED35F8CC479449609E8A0923A6" ma:contentTypeVersion="12" ma:contentTypeDescription="Create a new document." ma:contentTypeScope="" ma:versionID="a410dd7f93c95333ffa1b60ed6adedd1">
   <xsd:schema xmlns:xsd="http://www.w3.org/2001/XMLSchema" xmlns:xs="http://www.w3.org/2001/XMLSchema" xmlns:p="http://schemas.microsoft.com/office/2006/metadata/properties" xmlns:ns2="71af3243-3dd4-4a8d-8c0d-dd76da1f02a5" xmlns:ns3="16c05727-aa75-4e4a-9b5f-8a80a1165891" targetNamespace="http://schemas.microsoft.com/office/2006/metadata/properties" ma:root="true" ma:fieldsID="a936d9baba76aa3866493feff160faab" ns2:_="" ns3:_="">
     <xsd:import namespace="71af3243-3dd4-4a8d-8c0d-dd76da1f02a5"/>
@@ -9583,25 +10769,25 @@
 </ct:contentTypeSchema>
 </file>
 
-<file path=customXml/itemProps1.xml><?xml version="1.0" encoding="utf-8"?>
-<ds:datastoreItem xmlns:ds="http://schemas.openxmlformats.org/officeDocument/2006/customXml" ds:itemID="{137651BA-F45C-4845-9AB3-E0A65B39F5E1}">
-  <ds:schemaRefs>
-    <ds:schemaRef ds:uri="http://schemas.microsoft.com/office/2006/metadata/properties"/>
-    <ds:schemaRef ds:uri="http://schemas.microsoft.com/office/infopath/2007/PartnerControls"/>
-    <ds:schemaRef ds:uri="71af3243-3dd4-4a8d-8c0d-dd76da1f02a5"/>
-  </ds:schemaRefs>
-</ds:datastoreItem>
+<file path=customXml/item2.xml><?xml version="1.0" encoding="utf-8"?>
+<?mso-contentType ?>
+<FormTemplates xmlns="http://schemas.microsoft.com/sharepoint/v3/contenttype/forms">
+  <Display>DocumentLibraryForm</Display>
+  <Edit>DocumentLibraryForm</Edit>
+  <New>DocumentLibraryForm</New>
+</FormTemplates>
 </file>
 
-<file path=customXml/itemProps2.xml><?xml version="1.0" encoding="utf-8"?>
-<ds:datastoreItem xmlns:ds="http://schemas.openxmlformats.org/officeDocument/2006/customXml" ds:itemID="{CDB58277-F8DF-46FF-84EC-EF41B835E69F}">
-  <ds:schemaRefs>
-    <ds:schemaRef ds:uri="http://schemas.microsoft.com/sharepoint/v3/contenttype/forms"/>
-  </ds:schemaRefs>
-</ds:datastoreItem>
+<file path=customXml/item3.xml><?xml version="1.0" encoding="utf-8"?>
+<p:properties xmlns:p="http://schemas.microsoft.com/office/2006/metadata/properties" xmlns:xsi="http://www.w3.org/2001/XMLSchema-instance" xmlns:pc="http://schemas.microsoft.com/office/infopath/2007/PartnerControls">
+  <documentManagement>
+    <Status xmlns="71af3243-3dd4-4a8d-8c0d-dd76da1f02a5">Not started</Status>
+    <MediaServiceKeyPoints xmlns="71af3243-3dd4-4a8d-8c0d-dd76da1f02a5" xsi:nil="true"/>
+  </documentManagement>
+</p:properties>
 </file>
 
-<file path=customXml/itemProps3.xml><?xml version="1.0" encoding="utf-8"?>
+<file path=customXml/itemProps1.xml><?xml version="1.0" encoding="utf-8"?>
 <ds:datastoreItem xmlns:ds="http://schemas.openxmlformats.org/officeDocument/2006/customXml" ds:itemID="{2D276E62-80A3-44DD-9BCC-97ED2B99B57F}">
   <ds:schemaRefs>
     <ds:schemaRef ds:uri="http://schemas.microsoft.com/office/2006/metadata/contentType"/>
@@ -9618,4 +10804,22 @@
     <ds:schemaRef ds:uri="http://schemas.microsoft.com/internal/obd"/>
   </ds:schemaRefs>
 </ds:datastoreItem>
+</file>
+
+<file path=customXml/itemProps2.xml><?xml version="1.0" encoding="utf-8"?>
+<ds:datastoreItem xmlns:ds="http://schemas.openxmlformats.org/officeDocument/2006/customXml" ds:itemID="{CDB58277-F8DF-46FF-84EC-EF41B835E69F}">
+  <ds:schemaRefs>
+    <ds:schemaRef ds:uri="http://schemas.microsoft.com/sharepoint/v3/contenttype/forms"/>
+  </ds:schemaRefs>
+</ds:datastoreItem>
+</file>
+
+<file path=customXml/itemProps3.xml><?xml version="1.0" encoding="utf-8"?>
+<ds:datastoreItem xmlns:ds="http://schemas.openxmlformats.org/officeDocument/2006/customXml" ds:itemID="{137651BA-F45C-4845-9AB3-E0A65B39F5E1}">
+  <ds:schemaRefs>
+    <ds:schemaRef ds:uri="http://schemas.microsoft.com/office/2006/metadata/properties"/>
+    <ds:schemaRef ds:uri="http://schemas.microsoft.com/office/infopath/2007/PartnerControls"/>
+    <ds:schemaRef ds:uri="71af3243-3dd4-4a8d-8c0d-dd76da1f02a5"/>
+  </ds:schemaRefs>
+</ds:datastoreItem>
 </file>
</xml_diff>